<commit_message>
- User-defined parameters passed to the `createScenarios()` or `Scenario$new()` in the `customParams` argument are applied last. Up to this version, they were overwritten by the administration protocol (\#817)
- Update vignette
- Update workflow scheme source (pptx)
- Remove not used figures from vignettes
</commit_message>
<xml_diff>
--- a/vignettes/Workflow_scheme.pptx
+++ b/vignettes/Workflow_scheme.pptx
@@ -3308,31 +3308,7 @@
         <a:p>
           <a:r>
             <a:rPr lang="de-DE" sz="1600" dirty="0"/>
-            <a:t>Individual </a:t>
-          </a:r>
-          <a:r>
-            <a:rPr lang="de-DE" sz="1600" dirty="0" err="1"/>
-            <a:t>parameter</a:t>
-          </a:r>
-          <a:r>
-            <a:rPr lang="de-DE" sz="1600" dirty="0"/>
-            <a:t> </a:t>
-          </a:r>
-          <a:r>
-            <a:rPr lang="de-DE" sz="1600" dirty="0" err="1"/>
-            <a:t>values</a:t>
-          </a:r>
-          <a:r>
-            <a:rPr lang="de-DE" sz="1600" dirty="0"/>
-            <a:t> </a:t>
-          </a:r>
-          <a:r>
-            <a:rPr lang="de-DE" sz="1600" dirty="0" err="1"/>
-            <a:t>from</a:t>
-          </a:r>
-          <a:r>
-            <a:rPr lang="de-DE" sz="1600" dirty="0"/>
-            <a:t> „Individuals.xlsx“</a:t>
+            <a:t>Individual parameter values from „Individuals.xlsx“, if an individual is defined</a:t>
           </a:r>
         </a:p>
       </dgm:t>
@@ -3359,7 +3335,7 @@
         </a:p>
       </dgm:t>
     </dgm:pt>
-    <dgm:pt modelId="{91FC2AB7-B1E8-4D87-AF6A-71E755A3CAA2}">
+    <dgm:pt modelId="{A0C5C029-8814-4D05-983D-3C336CF05814}">
       <dgm:prSet phldrT="[Text]" custT="1"/>
       <dgm:spPr/>
       <dgm:t>
@@ -3367,157 +3343,104 @@
         <a:lstStyle/>
         <a:p>
           <a:r>
-            <a:rPr lang="de-DE" sz="1600" dirty="0"/>
-            <a:t>Parameters </a:t>
-          </a:r>
-          <a:r>
-            <a:rPr lang="de-DE" sz="1600" dirty="0" err="1"/>
-            <a:t>passed</a:t>
-          </a:r>
-          <a:r>
-            <a:rPr lang="de-DE" sz="1600" dirty="0"/>
-            <a:t> </a:t>
-          </a:r>
-          <a:r>
-            <a:rPr lang="de-DE" sz="1600" dirty="0" err="1"/>
-            <a:t>to</a:t>
-          </a:r>
-          <a:r>
-            <a:rPr lang="de-DE" sz="1600" dirty="0"/>
-            <a:t> „</a:t>
-          </a:r>
-          <a:r>
-            <a:rPr lang="de-DE" sz="1600" dirty="0" err="1"/>
-            <a:t>runScenarios</a:t>
-          </a:r>
-          <a:r>
-            <a:rPr lang="de-DE" sz="1600" dirty="0"/>
-            <a:t>()“ </a:t>
-          </a:r>
-          <a:r>
-            <a:rPr lang="de-DE" sz="1600" dirty="0" err="1"/>
-            <a:t>function</a:t>
-          </a:r>
-          <a:r>
-            <a:rPr lang="de-DE" sz="1600" dirty="0"/>
-            <a:t> </a:t>
-          </a:r>
-          <a:r>
-            <a:rPr lang="de-DE" sz="1600" dirty="0" err="1"/>
-            <a:t>with</a:t>
-          </a:r>
-          <a:r>
-            <a:rPr lang="de-DE" sz="1600" dirty="0"/>
-            <a:t> </a:t>
-          </a:r>
-          <a:r>
-            <a:rPr lang="de-DE" sz="1600" dirty="0" err="1"/>
-            <a:t>the</a:t>
-          </a:r>
-          <a:r>
-            <a:rPr lang="de-DE" sz="1600" dirty="0"/>
-            <a:t> „</a:t>
-          </a:r>
-          <a:r>
-            <a:rPr lang="de-DE" sz="1600" dirty="0" err="1"/>
-            <a:t>customParams</a:t>
-          </a:r>
-          <a:r>
-            <a:rPr lang="de-DE" sz="1600" dirty="0"/>
-            <a:t>“ </a:t>
-          </a:r>
-          <a:r>
-            <a:rPr lang="de-DE" sz="1600" dirty="0" err="1"/>
-            <a:t>argument</a:t>
-          </a:r>
-          <a:endParaRPr lang="de-DE" sz="1600" dirty="0"/>
+            <a:rPr lang="en-US" sz="1600" dirty="0"/>
+            <a:t>Individual characteristics, if an individual is defined</a:t>
+          </a:r>
         </a:p>
       </dgm:t>
     </dgm:pt>
-    <dgm:pt modelId="{D6B86AE7-3792-458A-98FF-74E6B591785F}" type="parTrans" cxnId="{D66BDF65-AD23-4328-B996-97D85E65D8D4}">
+    <dgm:pt modelId="{A6C3C3CD-7001-44CB-9E24-37B705F127E6}" type="parTrans" cxnId="{A8188029-61BC-49CB-8114-8A7E5FE89283}">
       <dgm:prSet/>
       <dgm:spPr/>
       <dgm:t>
         <a:bodyPr/>
         <a:lstStyle/>
         <a:p>
-          <a:endParaRPr lang="en-US"/>
+          <a:endParaRPr lang="en-DE"/>
         </a:p>
       </dgm:t>
     </dgm:pt>
-    <dgm:pt modelId="{69FE11D4-A6F2-44FB-9706-14C29F2E3AC8}" type="sibTrans" cxnId="{D66BDF65-AD23-4328-B996-97D85E65D8D4}">
+    <dgm:pt modelId="{E2F0A844-DFCA-43A8-93A5-5779D57A51EF}" type="sibTrans" cxnId="{A8188029-61BC-49CB-8114-8A7E5FE89283}">
       <dgm:prSet/>
       <dgm:spPr/>
       <dgm:t>
         <a:bodyPr/>
         <a:lstStyle/>
         <a:p>
-          <a:endParaRPr lang="en-US"/>
+          <a:endParaRPr lang="en-DE"/>
         </a:p>
       </dgm:t>
     </dgm:pt>
-    <dgm:pt modelId="{904D13CF-20B5-45F7-B411-C4B04322AD45}">
-      <dgm:prSet phldrT="[Text]"/>
+    <dgm:pt modelId="{F13CC23B-9AAB-4F7E-9E46-D6709B9774C1}">
+      <dgm:prSet phldrT="[Text]" custT="1"/>
       <dgm:spPr/>
       <dgm:t>
         <a:bodyPr/>
         <a:lstStyle/>
         <a:p>
           <a:r>
-            <a:rPr lang="de-DE" sz="1400" dirty="0"/>
-            <a:t>Parameters </a:t>
-          </a:r>
-          <a:r>
-            <a:rPr lang="de-DE" sz="1400" dirty="0" err="1"/>
-            <a:t>defined</a:t>
-          </a:r>
-          <a:r>
-            <a:rPr lang="de-DE" sz="1400" dirty="0"/>
-            <a:t> in </a:t>
-          </a:r>
-          <a:r>
-            <a:rPr lang="de-DE" sz="1400" dirty="0" err="1"/>
-            <a:t>the</a:t>
-          </a:r>
-          <a:r>
-            <a:rPr lang="de-DE" sz="1400" dirty="0"/>
-            <a:t> </a:t>
-          </a:r>
-          <a:r>
-            <a:rPr lang="de-DE" sz="1400" dirty="0" err="1"/>
-            <a:t>Application</a:t>
-          </a:r>
-          <a:r>
-            <a:rPr lang="de-DE" sz="1400" dirty="0"/>
-            <a:t> </a:t>
-          </a:r>
-          <a:r>
-            <a:rPr lang="de-DE" sz="1400" dirty="0" err="1"/>
-            <a:t>protocol</a:t>
-          </a:r>
-          <a:endParaRPr lang="de-DE" sz="1400" dirty="0"/>
+            <a:rPr lang="de-DE" sz="1600"/>
+            <a:t>Parameters defined in the Application protocol</a:t>
+          </a:r>
+          <a:endParaRPr lang="de-DE" sz="1600" dirty="0"/>
         </a:p>
       </dgm:t>
     </dgm:pt>
-    <dgm:pt modelId="{99E8C748-AFDC-4A43-B7B7-8C9ABB77872B}" type="parTrans" cxnId="{6ED578E0-0714-4963-AC6F-BA4BCDA4DEDD}">
+    <dgm:pt modelId="{09B68A51-B666-4ABB-BBB8-D583B92E995A}" type="parTrans" cxnId="{DE53D022-C67B-4F16-AA93-433BFA29F44A}">
       <dgm:prSet/>
       <dgm:spPr/>
       <dgm:t>
         <a:bodyPr/>
         <a:lstStyle/>
         <a:p>
-          <a:endParaRPr lang="en-US"/>
+          <a:endParaRPr lang="en-DE"/>
         </a:p>
       </dgm:t>
     </dgm:pt>
-    <dgm:pt modelId="{E8F05EC8-AF1F-4FDC-91AE-4FAE4C0B9391}" type="sibTrans" cxnId="{6ED578E0-0714-4963-AC6F-BA4BCDA4DEDD}">
+    <dgm:pt modelId="{E980A61F-8A91-4B69-999C-58C9E8BBD0A0}" type="sibTrans" cxnId="{DE53D022-C67B-4F16-AA93-433BFA29F44A}">
       <dgm:prSet/>
       <dgm:spPr/>
       <dgm:t>
         <a:bodyPr/>
         <a:lstStyle/>
         <a:p>
-          <a:endParaRPr lang="en-US"/>
+          <a:endParaRPr lang="en-DE"/>
+        </a:p>
+      </dgm:t>
+    </dgm:pt>
+    <dgm:pt modelId="{4490C687-B1F7-4E90-B206-3A9A39BAEB07}">
+      <dgm:prSet phldrT="[Text]" custT="1"/>
+      <dgm:spPr/>
+      <dgm:t>
+        <a:bodyPr/>
+        <a:lstStyle/>
+        <a:p>
+          <a:r>
+            <a:rPr lang="de-DE" sz="1600" dirty="0"/>
+            <a:t>Parameters passed to the „createScenarios()“ function with the „customParams“ argument</a:t>
+          </a:r>
+        </a:p>
+      </dgm:t>
+    </dgm:pt>
+    <dgm:pt modelId="{2FF6F0DB-2230-46C8-B0E0-238730163B33}" type="parTrans" cxnId="{EB392511-DD32-44E2-90E1-0D4691569D5D}">
+      <dgm:prSet/>
+      <dgm:spPr/>
+      <dgm:t>
+        <a:bodyPr/>
+        <a:lstStyle/>
+        <a:p>
+          <a:endParaRPr lang="en-DE"/>
+        </a:p>
+      </dgm:t>
+    </dgm:pt>
+    <dgm:pt modelId="{8B7F2B9F-B5D3-4EAD-8D0A-8BFC79F57D33}" type="sibTrans" cxnId="{EB392511-DD32-44E2-90E1-0D4691569D5D}">
+      <dgm:prSet/>
+      <dgm:spPr/>
+      <dgm:t>
+        <a:bodyPr/>
+        <a:lstStyle/>
+        <a:p>
+          <a:endParaRPr lang="en-DE"/>
         </a:p>
       </dgm:t>
     </dgm:pt>
@@ -3530,7 +3453,7 @@
       <dgm:spPr/>
     </dgm:pt>
     <dgm:pt modelId="{32F3F580-B4AE-4A75-B4D5-199177EDC857}" type="pres">
-      <dgm:prSet presAssocID="{6E63DDAB-E0C7-493D-AA1D-876DA0421EBF}" presName="node" presStyleLbl="node1" presStyleIdx="0" presStyleCnt="5">
+      <dgm:prSet presAssocID="{6E63DDAB-E0C7-493D-AA1D-876DA0421EBF}" presName="node" presStyleLbl="node1" presStyleIdx="0" presStyleCnt="6">
         <dgm:presLayoutVars>
           <dgm:bulletEnabled val="1"/>
         </dgm:presLayoutVars>
@@ -3538,15 +3461,15 @@
       <dgm:spPr/>
     </dgm:pt>
     <dgm:pt modelId="{DE734AF0-F15D-43AA-9AA5-E7449D3D3242}" type="pres">
-      <dgm:prSet presAssocID="{0C0BF99E-58D0-4FAA-A800-B1F81FBC0008}" presName="sibTrans" presStyleLbl="sibTrans2D1" presStyleIdx="0" presStyleCnt="4"/>
+      <dgm:prSet presAssocID="{0C0BF99E-58D0-4FAA-A800-B1F81FBC0008}" presName="sibTrans" presStyleLbl="sibTrans2D1" presStyleIdx="0" presStyleCnt="5"/>
       <dgm:spPr/>
     </dgm:pt>
     <dgm:pt modelId="{5E1CEAA5-0423-4DCA-8EB1-AEC797E763EE}" type="pres">
-      <dgm:prSet presAssocID="{0C0BF99E-58D0-4FAA-A800-B1F81FBC0008}" presName="connectorText" presStyleLbl="sibTrans2D1" presStyleIdx="0" presStyleCnt="4"/>
+      <dgm:prSet presAssocID="{0C0BF99E-58D0-4FAA-A800-B1F81FBC0008}" presName="connectorText" presStyleLbl="sibTrans2D1" presStyleIdx="0" presStyleCnt="5"/>
       <dgm:spPr/>
     </dgm:pt>
     <dgm:pt modelId="{8DB52F31-1B42-4B55-A5C5-93099FA660CA}" type="pres">
-      <dgm:prSet presAssocID="{D9A164A5-C4EE-4E2C-BCB9-FC9B1367C8C9}" presName="node" presStyleLbl="node1" presStyleIdx="1" presStyleCnt="5">
+      <dgm:prSet presAssocID="{D9A164A5-C4EE-4E2C-BCB9-FC9B1367C8C9}" presName="node" presStyleLbl="node1" presStyleIdx="1" presStyleCnt="6">
         <dgm:presLayoutVars>
           <dgm:bulletEnabled val="1"/>
         </dgm:presLayoutVars>
@@ -3554,72 +3477,92 @@
       <dgm:spPr/>
     </dgm:pt>
     <dgm:pt modelId="{D4AF0274-1388-4F6B-8D53-52A6FED89246}" type="pres">
-      <dgm:prSet presAssocID="{3A3A765D-45CB-4909-B3B4-7B9C8089DBBE}" presName="sibTrans" presStyleLbl="sibTrans2D1" presStyleIdx="1" presStyleCnt="4"/>
+      <dgm:prSet presAssocID="{3A3A765D-45CB-4909-B3B4-7B9C8089DBBE}" presName="sibTrans" presStyleLbl="sibTrans2D1" presStyleIdx="1" presStyleCnt="5"/>
       <dgm:spPr/>
     </dgm:pt>
     <dgm:pt modelId="{FA84D1E7-8CF9-4F3E-B109-DBB564D82884}" type="pres">
-      <dgm:prSet presAssocID="{3A3A765D-45CB-4909-B3B4-7B9C8089DBBE}" presName="connectorText" presStyleLbl="sibTrans2D1" presStyleIdx="1" presStyleCnt="4"/>
-      <dgm:spPr/>
-    </dgm:pt>
-    <dgm:pt modelId="{393E3C96-C34C-451A-92F8-886DD2CD2B93}" type="pres">
-      <dgm:prSet presAssocID="{0EA7596A-34F1-4CE4-AD46-2937F6D05F61}" presName="node" presStyleLbl="node1" presStyleIdx="2" presStyleCnt="5">
+      <dgm:prSet presAssocID="{3A3A765D-45CB-4909-B3B4-7B9C8089DBBE}" presName="connectorText" presStyleLbl="sibTrans2D1" presStyleIdx="1" presStyleCnt="5"/>
+      <dgm:spPr/>
+    </dgm:pt>
+    <dgm:pt modelId="{C625C72E-DFBD-4936-871E-23CCDB1E26A3}" type="pres">
+      <dgm:prSet presAssocID="{A0C5C029-8814-4D05-983D-3C336CF05814}" presName="node" presStyleLbl="node1" presStyleIdx="2" presStyleCnt="6">
         <dgm:presLayoutVars>
           <dgm:bulletEnabled val="1"/>
         </dgm:presLayoutVars>
       </dgm:prSet>
       <dgm:spPr/>
     </dgm:pt>
-    <dgm:pt modelId="{018C7C0E-1BF5-4952-ACA5-977E53384722}" type="pres">
-      <dgm:prSet presAssocID="{E3006435-1BF9-4FD6-9C31-7ED4490DE600}" presName="sibTrans" presStyleLbl="sibTrans2D1" presStyleIdx="2" presStyleCnt="4"/>
-      <dgm:spPr/>
-    </dgm:pt>
-    <dgm:pt modelId="{9A6F0891-C47C-4E2B-BFC4-7050A71F9598}" type="pres">
-      <dgm:prSet presAssocID="{E3006435-1BF9-4FD6-9C31-7ED4490DE600}" presName="connectorText" presStyleLbl="sibTrans2D1" presStyleIdx="2" presStyleCnt="4"/>
-      <dgm:spPr/>
-    </dgm:pt>
-    <dgm:pt modelId="{164DDEB3-DF6D-4D8A-AB77-57CE925C2E9F}" type="pres">
-      <dgm:prSet presAssocID="{91FC2AB7-B1E8-4D87-AF6A-71E755A3CAA2}" presName="node" presStyleLbl="node1" presStyleIdx="3" presStyleCnt="5">
+    <dgm:pt modelId="{CF86FC70-012F-40D6-8B9A-48484735C015}" type="pres">
+      <dgm:prSet presAssocID="{E2F0A844-DFCA-43A8-93A5-5779D57A51EF}" presName="sibTrans" presStyleLbl="sibTrans2D1" presStyleIdx="2" presStyleCnt="5"/>
+      <dgm:spPr/>
+    </dgm:pt>
+    <dgm:pt modelId="{171439AC-6B75-4B79-9606-CFF53C964BC7}" type="pres">
+      <dgm:prSet presAssocID="{E2F0A844-DFCA-43A8-93A5-5779D57A51EF}" presName="connectorText" presStyleLbl="sibTrans2D1" presStyleIdx="2" presStyleCnt="5"/>
+      <dgm:spPr/>
+    </dgm:pt>
+    <dgm:pt modelId="{393E3C96-C34C-451A-92F8-886DD2CD2B93}" type="pres">
+      <dgm:prSet presAssocID="{0EA7596A-34F1-4CE4-AD46-2937F6D05F61}" presName="node" presStyleLbl="node1" presStyleIdx="3" presStyleCnt="6">
         <dgm:presLayoutVars>
           <dgm:bulletEnabled val="1"/>
         </dgm:presLayoutVars>
       </dgm:prSet>
       <dgm:spPr/>
     </dgm:pt>
-    <dgm:pt modelId="{9BA57664-CD12-4F05-BF31-8399FF3938EE}" type="pres">
-      <dgm:prSet presAssocID="{69FE11D4-A6F2-44FB-9706-14C29F2E3AC8}" presName="sibTrans" presStyleLbl="sibTrans2D1" presStyleIdx="3" presStyleCnt="4"/>
-      <dgm:spPr/>
-    </dgm:pt>
-    <dgm:pt modelId="{C5DEC020-9475-4AE8-B5C4-B31F7E4BC4BF}" type="pres">
-      <dgm:prSet presAssocID="{69FE11D4-A6F2-44FB-9706-14C29F2E3AC8}" presName="connectorText" presStyleLbl="sibTrans2D1" presStyleIdx="3" presStyleCnt="4"/>
-      <dgm:spPr/>
-    </dgm:pt>
-    <dgm:pt modelId="{6F905638-7C0C-4414-A139-2B2E5BFB3BD8}" type="pres">
-      <dgm:prSet presAssocID="{904D13CF-20B5-45F7-B411-C4B04322AD45}" presName="node" presStyleLbl="node1" presStyleIdx="4" presStyleCnt="5">
+    <dgm:pt modelId="{018C7C0E-1BF5-4952-ACA5-977E53384722}" type="pres">
+      <dgm:prSet presAssocID="{E3006435-1BF9-4FD6-9C31-7ED4490DE600}" presName="sibTrans" presStyleLbl="sibTrans2D1" presStyleIdx="3" presStyleCnt="5"/>
+      <dgm:spPr/>
+    </dgm:pt>
+    <dgm:pt modelId="{9A6F0891-C47C-4E2B-BFC4-7050A71F9598}" type="pres">
+      <dgm:prSet presAssocID="{E3006435-1BF9-4FD6-9C31-7ED4490DE600}" presName="connectorText" presStyleLbl="sibTrans2D1" presStyleIdx="3" presStyleCnt="5"/>
+      <dgm:spPr/>
+    </dgm:pt>
+    <dgm:pt modelId="{585E7A7C-0464-4CE6-954B-DB59E1BB4AE8}" type="pres">
+      <dgm:prSet presAssocID="{F13CC23B-9AAB-4F7E-9E46-D6709B9774C1}" presName="node" presStyleLbl="node1" presStyleIdx="4" presStyleCnt="6">
         <dgm:presLayoutVars>
           <dgm:bulletEnabled val="1"/>
         </dgm:presLayoutVars>
       </dgm:prSet>
       <dgm:spPr/>
     </dgm:pt>
+    <dgm:pt modelId="{C73E5510-A645-4B66-BE03-8D62734B4D94}" type="pres">
+      <dgm:prSet presAssocID="{E980A61F-8A91-4B69-999C-58C9E8BBD0A0}" presName="sibTrans" presStyleLbl="sibTrans2D1" presStyleIdx="4" presStyleCnt="5"/>
+      <dgm:spPr/>
+    </dgm:pt>
+    <dgm:pt modelId="{D3E31B5D-53E9-4C54-9BC8-CF6E93FDE636}" type="pres">
+      <dgm:prSet presAssocID="{E980A61F-8A91-4B69-999C-58C9E8BBD0A0}" presName="connectorText" presStyleLbl="sibTrans2D1" presStyleIdx="4" presStyleCnt="5"/>
+      <dgm:spPr/>
+    </dgm:pt>
+    <dgm:pt modelId="{F76A027D-16C8-4857-90A5-3A8DF22F9B46}" type="pres">
+      <dgm:prSet presAssocID="{4490C687-B1F7-4E90-B206-3A9A39BAEB07}" presName="node" presStyleLbl="node1" presStyleIdx="5" presStyleCnt="6">
+        <dgm:presLayoutVars>
+          <dgm:bulletEnabled val="1"/>
+        </dgm:presLayoutVars>
+      </dgm:prSet>
+      <dgm:spPr/>
+    </dgm:pt>
   </dgm:ptLst>
   <dgm:cxnLst>
     <dgm:cxn modelId="{F97F7400-5F3F-4511-99AF-C09BD42FD039}" type="presOf" srcId="{E3006435-1BF9-4FD6-9C31-7ED4490DE600}" destId="{9A6F0891-C47C-4E2B-BFC4-7050A71F9598}" srcOrd="1" destOrd="0" presId="urn:microsoft.com/office/officeart/2005/8/layout/process2"/>
-    <dgm:cxn modelId="{DD444703-08F9-4BBF-AC2A-0976E6EAA556}" srcId="{4C6B6F34-EBF2-438E-B3B7-957DBAF6DA06}" destId="{0EA7596A-34F1-4CE4-AD46-2937F6D05F61}" srcOrd="2" destOrd="0" parTransId="{F43BB90B-B156-42E6-9B7C-9F90F9B30A68}" sibTransId="{E3006435-1BF9-4FD6-9C31-7ED4490DE600}"/>
+    <dgm:cxn modelId="{DD444703-08F9-4BBF-AC2A-0976E6EAA556}" srcId="{4C6B6F34-EBF2-438E-B3B7-957DBAF6DA06}" destId="{0EA7596A-34F1-4CE4-AD46-2937F6D05F61}" srcOrd="3" destOrd="0" parTransId="{F43BB90B-B156-42E6-9B7C-9F90F9B30A68}" sibTransId="{E3006435-1BF9-4FD6-9C31-7ED4490DE600}"/>
     <dgm:cxn modelId="{085A1E0C-FAE9-4517-BEB5-3719AAFE0535}" type="presOf" srcId="{3A3A765D-45CB-4909-B3B4-7B9C8089DBBE}" destId="{D4AF0274-1388-4F6B-8D53-52A6FED89246}" srcOrd="0" destOrd="0" presId="urn:microsoft.com/office/officeart/2005/8/layout/process2"/>
+    <dgm:cxn modelId="{EB392511-DD32-44E2-90E1-0D4691569D5D}" srcId="{4C6B6F34-EBF2-438E-B3B7-957DBAF6DA06}" destId="{4490C687-B1F7-4E90-B206-3A9A39BAEB07}" srcOrd="5" destOrd="0" parTransId="{2FF6F0DB-2230-46C8-B0E0-238730163B33}" sibTransId="{8B7F2B9F-B5D3-4EAD-8D0A-8BFC79F57D33}"/>
+    <dgm:cxn modelId="{DE53D022-C67B-4F16-AA93-433BFA29F44A}" srcId="{4C6B6F34-EBF2-438E-B3B7-957DBAF6DA06}" destId="{F13CC23B-9AAB-4F7E-9E46-D6709B9774C1}" srcOrd="4" destOrd="0" parTransId="{09B68A51-B666-4ABB-BBB8-D583B92E995A}" sibTransId="{E980A61F-8A91-4B69-999C-58C9E8BBD0A0}"/>
     <dgm:cxn modelId="{58FFE822-79DD-45BE-A39D-0AEC2D33D243}" type="presOf" srcId="{D9A164A5-C4EE-4E2C-BCB9-FC9B1367C8C9}" destId="{8DB52F31-1B42-4B55-A5C5-93099FA660CA}" srcOrd="0" destOrd="0" presId="urn:microsoft.com/office/officeart/2005/8/layout/process2"/>
+    <dgm:cxn modelId="{A8188029-61BC-49CB-8114-8A7E5FE89283}" srcId="{4C6B6F34-EBF2-438E-B3B7-957DBAF6DA06}" destId="{A0C5C029-8814-4D05-983D-3C336CF05814}" srcOrd="2" destOrd="0" parTransId="{A6C3C3CD-7001-44CB-9E24-37B705F127E6}" sibTransId="{E2F0A844-DFCA-43A8-93A5-5779D57A51EF}"/>
     <dgm:cxn modelId="{3B417F30-F813-4EA9-B108-43EF204F7770}" type="presOf" srcId="{0C0BF99E-58D0-4FAA-A800-B1F81FBC0008}" destId="{DE734AF0-F15D-43AA-9AA5-E7449D3D3242}" srcOrd="0" destOrd="0" presId="urn:microsoft.com/office/officeart/2005/8/layout/process2"/>
     <dgm:cxn modelId="{F0B6D332-99FB-4164-A8B7-AB0DED1125E0}" srcId="{4C6B6F34-EBF2-438E-B3B7-957DBAF6DA06}" destId="{6E63DDAB-E0C7-493D-AA1D-876DA0421EBF}" srcOrd="0" destOrd="0" parTransId="{0F29EA39-47A9-456B-B289-6276254019D4}" sibTransId="{0C0BF99E-58D0-4FAA-A800-B1F81FBC0008}"/>
-    <dgm:cxn modelId="{7DF06565-05CB-4B0F-BBA8-F00B84787873}" type="presOf" srcId="{91FC2AB7-B1E8-4D87-AF6A-71E755A3CAA2}" destId="{164DDEB3-DF6D-4D8A-AB77-57CE925C2E9F}" srcOrd="0" destOrd="0" presId="urn:microsoft.com/office/officeart/2005/8/layout/process2"/>
-    <dgm:cxn modelId="{D66BDF65-AD23-4328-B996-97D85E65D8D4}" srcId="{4C6B6F34-EBF2-438E-B3B7-957DBAF6DA06}" destId="{91FC2AB7-B1E8-4D87-AF6A-71E755A3CAA2}" srcOrd="3" destOrd="0" parTransId="{D6B86AE7-3792-458A-98FF-74E6B591785F}" sibTransId="{69FE11D4-A6F2-44FB-9706-14C29F2E3AC8}"/>
+    <dgm:cxn modelId="{0040AF68-B5FD-4FA5-8E9E-AA0B8D4673AC}" type="presOf" srcId="{4490C687-B1F7-4E90-B206-3A9A39BAEB07}" destId="{F76A027D-16C8-4857-90A5-3A8DF22F9B46}" srcOrd="0" destOrd="0" presId="urn:microsoft.com/office/officeart/2005/8/layout/process2"/>
+    <dgm:cxn modelId="{F7C1D348-BC8A-45FB-A0E3-0CC82DACE7F9}" type="presOf" srcId="{F13CC23B-9AAB-4F7E-9E46-D6709B9774C1}" destId="{585E7A7C-0464-4CE6-954B-DB59E1BB4AE8}" srcOrd="0" destOrd="0" presId="urn:microsoft.com/office/officeart/2005/8/layout/process2"/>
+    <dgm:cxn modelId="{2723FF6A-D170-44AD-8BFB-F1393EA30F54}" type="presOf" srcId="{E2F0A844-DFCA-43A8-93A5-5779D57A51EF}" destId="{171439AC-6B75-4B79-9606-CFF53C964BC7}" srcOrd="1" destOrd="0" presId="urn:microsoft.com/office/officeart/2005/8/layout/process2"/>
     <dgm:cxn modelId="{041BE877-F74B-4506-8223-BAA0514CDF4F}" type="presOf" srcId="{4C6B6F34-EBF2-438E-B3B7-957DBAF6DA06}" destId="{0F8C4796-60B9-44F0-95F7-C8F53E0D6F5B}" srcOrd="0" destOrd="0" presId="urn:microsoft.com/office/officeart/2005/8/layout/process2"/>
-    <dgm:cxn modelId="{9505A47A-7635-4F9C-ACDD-8AAC4600A121}" type="presOf" srcId="{69FE11D4-A6F2-44FB-9706-14C29F2E3AC8}" destId="{C5DEC020-9475-4AE8-B5C4-B31F7E4BC4BF}" srcOrd="1" destOrd="0" presId="urn:microsoft.com/office/officeart/2005/8/layout/process2"/>
     <dgm:cxn modelId="{13FCCE7E-9669-4D5E-95D5-2B01BD92A353}" type="presOf" srcId="{0C0BF99E-58D0-4FAA-A800-B1F81FBC0008}" destId="{5E1CEAA5-0423-4DCA-8EB1-AEC797E763EE}" srcOrd="1" destOrd="0" presId="urn:microsoft.com/office/officeart/2005/8/layout/process2"/>
+    <dgm:cxn modelId="{87EC20A0-4BEC-49F1-83C1-DA9395FADF3D}" type="presOf" srcId="{E980A61F-8A91-4B69-999C-58C9E8BBD0A0}" destId="{C73E5510-A645-4B66-BE03-8D62734B4D94}" srcOrd="0" destOrd="0" presId="urn:microsoft.com/office/officeart/2005/8/layout/process2"/>
+    <dgm:cxn modelId="{7FB661A7-200E-4228-AC39-4537EB67B512}" type="presOf" srcId="{A0C5C029-8814-4D05-983D-3C336CF05814}" destId="{C625C72E-DFBD-4936-871E-23CCDB1E26A3}" srcOrd="0" destOrd="0" presId="urn:microsoft.com/office/officeart/2005/8/layout/process2"/>
+    <dgm:cxn modelId="{66E811B9-8D54-4C79-AF42-257D01D27DDE}" type="presOf" srcId="{E2F0A844-DFCA-43A8-93A5-5779D57A51EF}" destId="{CF86FC70-012F-40D6-8B9A-48484735C015}" srcOrd="0" destOrd="0" presId="urn:microsoft.com/office/officeart/2005/8/layout/process2"/>
     <dgm:cxn modelId="{727F38CF-C7C3-47A9-8F05-5B2A08850324}" type="presOf" srcId="{E3006435-1BF9-4FD6-9C31-7ED4490DE600}" destId="{018C7C0E-1BF5-4952-ACA5-977E53384722}" srcOrd="0" destOrd="0" presId="urn:microsoft.com/office/officeart/2005/8/layout/process2"/>
     <dgm:cxn modelId="{9DDAD1D2-B693-448D-AA4B-57AF44DAAFE5}" type="presOf" srcId="{3A3A765D-45CB-4909-B3B4-7B9C8089DBBE}" destId="{FA84D1E7-8CF9-4F3E-B109-DBB564D82884}" srcOrd="1" destOrd="0" presId="urn:microsoft.com/office/officeart/2005/8/layout/process2"/>
-    <dgm:cxn modelId="{0642FAD5-29D0-4E72-AB17-3364D2E947FE}" type="presOf" srcId="{904D13CF-20B5-45F7-B411-C4B04322AD45}" destId="{6F905638-7C0C-4414-A139-2B2E5BFB3BD8}" srcOrd="0" destOrd="0" presId="urn:microsoft.com/office/officeart/2005/8/layout/process2"/>
-    <dgm:cxn modelId="{6ED578E0-0714-4963-AC6F-BA4BCDA4DEDD}" srcId="{4C6B6F34-EBF2-438E-B3B7-957DBAF6DA06}" destId="{904D13CF-20B5-45F7-B411-C4B04322AD45}" srcOrd="4" destOrd="0" parTransId="{99E8C748-AFDC-4A43-B7B7-8C9ABB77872B}" sibTransId="{E8F05EC8-AF1F-4FDC-91AE-4FAE4C0B9391}"/>
     <dgm:cxn modelId="{84DA56E3-F24E-4F53-AD97-DB23D066A087}" type="presOf" srcId="{0EA7596A-34F1-4CE4-AD46-2937F6D05F61}" destId="{393E3C96-C34C-451A-92F8-886DD2CD2B93}" srcOrd="0" destOrd="0" presId="urn:microsoft.com/office/officeart/2005/8/layout/process2"/>
-    <dgm:cxn modelId="{5D3071EB-87D3-4049-85C8-C8C2CA8C9DA1}" type="presOf" srcId="{69FE11D4-A6F2-44FB-9706-14C29F2E3AC8}" destId="{9BA57664-CD12-4F05-BF31-8399FF3938EE}" srcOrd="0" destOrd="0" presId="urn:microsoft.com/office/officeart/2005/8/layout/process2"/>
+    <dgm:cxn modelId="{D19017EA-7715-4F13-8809-944C75CE336A}" type="presOf" srcId="{E980A61F-8A91-4B69-999C-58C9E8BBD0A0}" destId="{D3E31B5D-53E9-4C54-9BC8-CF6E93FDE636}" srcOrd="1" destOrd="0" presId="urn:microsoft.com/office/officeart/2005/8/layout/process2"/>
     <dgm:cxn modelId="{923B37EE-D128-4A8A-84A7-FA079699B387}" type="presOf" srcId="{6E63DDAB-E0C7-493D-AA1D-876DA0421EBF}" destId="{32F3F580-B4AE-4A75-B4D5-199177EDC857}" srcOrd="0" destOrd="0" presId="urn:microsoft.com/office/officeart/2005/8/layout/process2"/>
     <dgm:cxn modelId="{256209F6-6CBC-4B7E-B7FD-2B6C071D798B}" srcId="{4C6B6F34-EBF2-438E-B3B7-957DBAF6DA06}" destId="{D9A164A5-C4EE-4E2C-BCB9-FC9B1367C8C9}" srcOrd="1" destOrd="0" parTransId="{4AA0B12F-FC0A-441A-8E6D-B24937D51028}" sibTransId="{3A3A765D-45CB-4909-B3B4-7B9C8089DBBE}"/>
     <dgm:cxn modelId="{2FF728A6-324E-4371-9CF3-A0D616AD4A9D}" type="presParOf" srcId="{0F8C4796-60B9-44F0-95F7-C8F53E0D6F5B}" destId="{32F3F580-B4AE-4A75-B4D5-199177EDC857}" srcOrd="0" destOrd="0" presId="urn:microsoft.com/office/officeart/2005/8/layout/process2"/>
@@ -3628,13 +3571,16 @@
     <dgm:cxn modelId="{827B7235-439D-465C-821B-D95D0345666A}" type="presParOf" srcId="{0F8C4796-60B9-44F0-95F7-C8F53E0D6F5B}" destId="{8DB52F31-1B42-4B55-A5C5-93099FA660CA}" srcOrd="2" destOrd="0" presId="urn:microsoft.com/office/officeart/2005/8/layout/process2"/>
     <dgm:cxn modelId="{41DA6530-C161-4E04-BE6A-9C4D956745B1}" type="presParOf" srcId="{0F8C4796-60B9-44F0-95F7-C8F53E0D6F5B}" destId="{D4AF0274-1388-4F6B-8D53-52A6FED89246}" srcOrd="3" destOrd="0" presId="urn:microsoft.com/office/officeart/2005/8/layout/process2"/>
     <dgm:cxn modelId="{B5B52E67-525C-400A-B349-2AA336FEC8CE}" type="presParOf" srcId="{D4AF0274-1388-4F6B-8D53-52A6FED89246}" destId="{FA84D1E7-8CF9-4F3E-B109-DBB564D82884}" srcOrd="0" destOrd="0" presId="urn:microsoft.com/office/officeart/2005/8/layout/process2"/>
-    <dgm:cxn modelId="{9DD2B436-5F21-4E06-AEA8-F4763CC1FC3A}" type="presParOf" srcId="{0F8C4796-60B9-44F0-95F7-C8F53E0D6F5B}" destId="{393E3C96-C34C-451A-92F8-886DD2CD2B93}" srcOrd="4" destOrd="0" presId="urn:microsoft.com/office/officeart/2005/8/layout/process2"/>
-    <dgm:cxn modelId="{079CEB64-8379-4B4B-8CD1-1E1313245DFE}" type="presParOf" srcId="{0F8C4796-60B9-44F0-95F7-C8F53E0D6F5B}" destId="{018C7C0E-1BF5-4952-ACA5-977E53384722}" srcOrd="5" destOrd="0" presId="urn:microsoft.com/office/officeart/2005/8/layout/process2"/>
+    <dgm:cxn modelId="{CDE239E8-F249-4C93-8B9E-546532C0759F}" type="presParOf" srcId="{0F8C4796-60B9-44F0-95F7-C8F53E0D6F5B}" destId="{C625C72E-DFBD-4936-871E-23CCDB1E26A3}" srcOrd="4" destOrd="0" presId="urn:microsoft.com/office/officeart/2005/8/layout/process2"/>
+    <dgm:cxn modelId="{463B7151-207A-408B-9A5B-80B20777A94A}" type="presParOf" srcId="{0F8C4796-60B9-44F0-95F7-C8F53E0D6F5B}" destId="{CF86FC70-012F-40D6-8B9A-48484735C015}" srcOrd="5" destOrd="0" presId="urn:microsoft.com/office/officeart/2005/8/layout/process2"/>
+    <dgm:cxn modelId="{08DAAA28-23F9-4A11-8100-705B23AE15B6}" type="presParOf" srcId="{CF86FC70-012F-40D6-8B9A-48484735C015}" destId="{171439AC-6B75-4B79-9606-CFF53C964BC7}" srcOrd="0" destOrd="0" presId="urn:microsoft.com/office/officeart/2005/8/layout/process2"/>
+    <dgm:cxn modelId="{9DD2B436-5F21-4E06-AEA8-F4763CC1FC3A}" type="presParOf" srcId="{0F8C4796-60B9-44F0-95F7-C8F53E0D6F5B}" destId="{393E3C96-C34C-451A-92F8-886DD2CD2B93}" srcOrd="6" destOrd="0" presId="urn:microsoft.com/office/officeart/2005/8/layout/process2"/>
+    <dgm:cxn modelId="{079CEB64-8379-4B4B-8CD1-1E1313245DFE}" type="presParOf" srcId="{0F8C4796-60B9-44F0-95F7-C8F53E0D6F5B}" destId="{018C7C0E-1BF5-4952-ACA5-977E53384722}" srcOrd="7" destOrd="0" presId="urn:microsoft.com/office/officeart/2005/8/layout/process2"/>
     <dgm:cxn modelId="{E2AEF74D-31B1-451D-9D8E-B03F88929D0F}" type="presParOf" srcId="{018C7C0E-1BF5-4952-ACA5-977E53384722}" destId="{9A6F0891-C47C-4E2B-BFC4-7050A71F9598}" srcOrd="0" destOrd="0" presId="urn:microsoft.com/office/officeart/2005/8/layout/process2"/>
-    <dgm:cxn modelId="{35376DAD-FC46-484D-94CE-3EC64D85CACF}" type="presParOf" srcId="{0F8C4796-60B9-44F0-95F7-C8F53E0D6F5B}" destId="{164DDEB3-DF6D-4D8A-AB77-57CE925C2E9F}" srcOrd="6" destOrd="0" presId="urn:microsoft.com/office/officeart/2005/8/layout/process2"/>
-    <dgm:cxn modelId="{B8FDD49C-5E2A-4F63-BD96-A33F796A894A}" type="presParOf" srcId="{0F8C4796-60B9-44F0-95F7-C8F53E0D6F5B}" destId="{9BA57664-CD12-4F05-BF31-8399FF3938EE}" srcOrd="7" destOrd="0" presId="urn:microsoft.com/office/officeart/2005/8/layout/process2"/>
-    <dgm:cxn modelId="{FEA80009-8437-40D8-A756-FAEC93C34A2D}" type="presParOf" srcId="{9BA57664-CD12-4F05-BF31-8399FF3938EE}" destId="{C5DEC020-9475-4AE8-B5C4-B31F7E4BC4BF}" srcOrd="0" destOrd="0" presId="urn:microsoft.com/office/officeart/2005/8/layout/process2"/>
-    <dgm:cxn modelId="{2135BFA1-8F37-4129-84FB-B2C5E959083D}" type="presParOf" srcId="{0F8C4796-60B9-44F0-95F7-C8F53E0D6F5B}" destId="{6F905638-7C0C-4414-A139-2B2E5BFB3BD8}" srcOrd="8" destOrd="0" presId="urn:microsoft.com/office/officeart/2005/8/layout/process2"/>
+    <dgm:cxn modelId="{0E2E67D8-67D0-41B0-BB7A-CBFE6B235848}" type="presParOf" srcId="{0F8C4796-60B9-44F0-95F7-C8F53E0D6F5B}" destId="{585E7A7C-0464-4CE6-954B-DB59E1BB4AE8}" srcOrd="8" destOrd="0" presId="urn:microsoft.com/office/officeart/2005/8/layout/process2"/>
+    <dgm:cxn modelId="{87EAC614-5DFA-45A0-9CD2-0F9E8042F42A}" type="presParOf" srcId="{0F8C4796-60B9-44F0-95F7-C8F53E0D6F5B}" destId="{C73E5510-A645-4B66-BE03-8D62734B4D94}" srcOrd="9" destOrd="0" presId="urn:microsoft.com/office/officeart/2005/8/layout/process2"/>
+    <dgm:cxn modelId="{099D4C04-B717-485F-8B57-499FC9147F8F}" type="presParOf" srcId="{C73E5510-A645-4B66-BE03-8D62734B4D94}" destId="{D3E31B5D-53E9-4C54-9BC8-CF6E93FDE636}" srcOrd="0" destOrd="0" presId="urn:microsoft.com/office/officeart/2005/8/layout/process2"/>
+    <dgm:cxn modelId="{4C7F9B42-964D-4DDA-8BF4-0E0043203657}" type="presParOf" srcId="{0F8C4796-60B9-44F0-95F7-C8F53E0D6F5B}" destId="{F76A027D-16C8-4857-90A5-3A8DF22F9B46}" srcOrd="10" destOrd="0" presId="urn:microsoft.com/office/officeart/2005/8/layout/process2"/>
   </dgm:cxnLst>
   <dgm:bg/>
   <dgm:whole/>
@@ -5533,8 +5479,8 @@
       </dsp:nvSpPr>
       <dsp:spPr>
         <a:xfrm>
-          <a:off x="2586222" y="778"/>
-          <a:ext cx="2955555" cy="911153"/>
+          <a:off x="2565565" y="5643"/>
+          <a:ext cx="2996869" cy="749217"/>
         </a:xfrm>
         <a:prstGeom prst="roundRect">
           <a:avLst>
@@ -5611,8 +5557,8 @@
         </a:p>
       </dsp:txBody>
       <dsp:txXfrm>
-        <a:off x="2612909" y="27465"/>
-        <a:ext cx="2902181" cy="857779"/>
+        <a:off x="2587509" y="27587"/>
+        <a:ext cx="2952981" cy="705329"/>
       </dsp:txXfrm>
     </dsp:sp>
     <dsp:sp modelId="{DE734AF0-F15D-43AA-9AA5-E7449D3D3242}">
@@ -5622,8 +5568,8 @@
       </dsp:nvSpPr>
       <dsp:spPr>
         <a:xfrm rot="5400000">
-          <a:off x="3893158" y="934711"/>
-          <a:ext cx="341682" cy="410019"/>
+          <a:off x="3923521" y="773591"/>
+          <a:ext cx="280956" cy="337147"/>
         </a:xfrm>
         <a:prstGeom prst="rightArrow">
           <a:avLst>
@@ -5681,8 +5627,8 @@
         </a:p>
       </dsp:txBody>
       <dsp:txXfrm rot="-5400000">
-        <a:off x="3940994" y="968880"/>
-        <a:ext cx="246011" cy="239177"/>
+        <a:off x="3962855" y="801687"/>
+        <a:ext cx="202289" cy="196669"/>
       </dsp:txXfrm>
     </dsp:sp>
     <dsp:sp modelId="{8DB52F31-1B42-4B55-A5C5-93099FA660CA}">
@@ -5692,8 +5638,8 @@
       </dsp:nvSpPr>
       <dsp:spPr>
         <a:xfrm>
-          <a:off x="2586222" y="1367509"/>
-          <a:ext cx="2955555" cy="911153"/>
+          <a:off x="2565565" y="1129469"/>
+          <a:ext cx="2996869" cy="749217"/>
         </a:xfrm>
         <a:prstGeom prst="roundRect">
           <a:avLst>
@@ -5822,8 +5768,8 @@
         </a:p>
       </dsp:txBody>
       <dsp:txXfrm>
-        <a:off x="2612909" y="1394196"/>
-        <a:ext cx="2902181" cy="857779"/>
+        <a:off x="2587509" y="1151413"/>
+        <a:ext cx="2952981" cy="705329"/>
       </dsp:txXfrm>
     </dsp:sp>
     <dsp:sp modelId="{D4AF0274-1388-4F6B-8D53-52A6FED89246}">
@@ -5833,8 +5779,8 @@
       </dsp:nvSpPr>
       <dsp:spPr>
         <a:xfrm rot="5400000">
-          <a:off x="3893158" y="2301442"/>
-          <a:ext cx="341682" cy="410019"/>
+          <a:off x="3923521" y="1897417"/>
+          <a:ext cx="280956" cy="337147"/>
         </a:xfrm>
         <a:prstGeom prst="rightArrow">
           <a:avLst>
@@ -5892,19 +5838,19 @@
         </a:p>
       </dsp:txBody>
       <dsp:txXfrm rot="-5400000">
-        <a:off x="3940994" y="2335611"/>
-        <a:ext cx="246011" cy="239177"/>
+        <a:off x="3962855" y="1925513"/>
+        <a:ext cx="202289" cy="196669"/>
       </dsp:txXfrm>
     </dsp:sp>
-    <dsp:sp modelId="{393E3C96-C34C-451A-92F8-886DD2CD2B93}">
+    <dsp:sp modelId="{C625C72E-DFBD-4936-871E-23CCDB1E26A3}">
       <dsp:nvSpPr>
         <dsp:cNvPr id="0" name=""/>
         <dsp:cNvSpPr/>
       </dsp:nvSpPr>
       <dsp:spPr>
         <a:xfrm>
-          <a:off x="2586222" y="2734240"/>
-          <a:ext cx="2955555" cy="911153"/>
+          <a:off x="2565565" y="2253295"/>
+          <a:ext cx="2996869" cy="749217"/>
         </a:xfrm>
         <a:prstGeom prst="roundRect">
           <a:avLst>
@@ -5966,49 +5912,25 @@
             <a:buNone/>
           </a:pPr>
           <a:r>
-            <a:rPr lang="de-DE" sz="1600" kern="1200" dirty="0"/>
-            <a:t>Individual </a:t>
-          </a:r>
-          <a:r>
-            <a:rPr lang="de-DE" sz="1600" kern="1200" dirty="0" err="1"/>
-            <a:t>parameter</a:t>
-          </a:r>
-          <a:r>
-            <a:rPr lang="de-DE" sz="1600" kern="1200" dirty="0"/>
-            <a:t> </a:t>
-          </a:r>
-          <a:r>
-            <a:rPr lang="de-DE" sz="1600" kern="1200" dirty="0" err="1"/>
-            <a:t>values</a:t>
-          </a:r>
-          <a:r>
-            <a:rPr lang="de-DE" sz="1600" kern="1200" dirty="0"/>
-            <a:t> </a:t>
-          </a:r>
-          <a:r>
-            <a:rPr lang="de-DE" sz="1600" kern="1200" dirty="0" err="1"/>
-            <a:t>from</a:t>
-          </a:r>
-          <a:r>
-            <a:rPr lang="de-DE" sz="1600" kern="1200" dirty="0"/>
-            <a:t> „Individuals.xlsx“</a:t>
+            <a:rPr lang="en-US" sz="1600" kern="1200" dirty="0"/>
+            <a:t>Individual characteristics, if an individual is defined</a:t>
           </a:r>
         </a:p>
       </dsp:txBody>
       <dsp:txXfrm>
-        <a:off x="2612909" y="2760927"/>
-        <a:ext cx="2902181" cy="857779"/>
+        <a:off x="2587509" y="2275239"/>
+        <a:ext cx="2952981" cy="705329"/>
       </dsp:txXfrm>
     </dsp:sp>
-    <dsp:sp modelId="{018C7C0E-1BF5-4952-ACA5-977E53384722}">
+    <dsp:sp modelId="{CF86FC70-012F-40D6-8B9A-48484735C015}">
       <dsp:nvSpPr>
         <dsp:cNvPr id="0" name=""/>
         <dsp:cNvSpPr/>
       </dsp:nvSpPr>
       <dsp:spPr>
         <a:xfrm rot="5400000">
-          <a:off x="3893158" y="3668172"/>
-          <a:ext cx="341682" cy="410019"/>
+          <a:off x="3923521" y="3021243"/>
+          <a:ext cx="280956" cy="337147"/>
         </a:xfrm>
         <a:prstGeom prst="rightArrow">
           <a:avLst>
@@ -6050,7 +5972,7 @@
         </a:bodyPr>
         <a:lstStyle/>
         <a:p>
-          <a:pPr marL="0" lvl="0" indent="0" algn="ctr" defTabSz="1066800">
+          <a:pPr marL="0" lvl="0" indent="0" algn="ctr" defTabSz="622300">
             <a:lnSpc>
               <a:spcPct val="90000"/>
             </a:lnSpc>
@@ -6062,23 +5984,23 @@
             </a:spcAft>
             <a:buNone/>
           </a:pPr>
-          <a:endParaRPr lang="en-US" sz="2400" kern="1200"/>
+          <a:endParaRPr lang="en-DE" sz="1400" kern="1200"/>
         </a:p>
       </dsp:txBody>
       <dsp:txXfrm rot="-5400000">
-        <a:off x="3940994" y="3702341"/>
-        <a:ext cx="246011" cy="239177"/>
+        <a:off x="3962855" y="3049339"/>
+        <a:ext cx="202289" cy="196669"/>
       </dsp:txXfrm>
     </dsp:sp>
-    <dsp:sp modelId="{164DDEB3-DF6D-4D8A-AB77-57CE925C2E9F}">
+    <dsp:sp modelId="{393E3C96-C34C-451A-92F8-886DD2CD2B93}">
       <dsp:nvSpPr>
         <dsp:cNvPr id="0" name=""/>
         <dsp:cNvSpPr/>
       </dsp:nvSpPr>
       <dsp:spPr>
         <a:xfrm>
-          <a:off x="2586222" y="4100970"/>
-          <a:ext cx="2955555" cy="911153"/>
+          <a:off x="2565565" y="3377121"/>
+          <a:ext cx="2996869" cy="749217"/>
         </a:xfrm>
         <a:prstGeom prst="roundRect">
           <a:avLst>
@@ -6141,85 +6063,24 @@
           </a:pPr>
           <a:r>
             <a:rPr lang="de-DE" sz="1600" kern="1200" dirty="0"/>
-            <a:t>Parameters </a:t>
-          </a:r>
-          <a:r>
-            <a:rPr lang="de-DE" sz="1600" kern="1200" dirty="0" err="1"/>
-            <a:t>passed</a:t>
-          </a:r>
-          <a:r>
-            <a:rPr lang="de-DE" sz="1600" kern="1200" dirty="0"/>
-            <a:t> </a:t>
-          </a:r>
-          <a:r>
-            <a:rPr lang="de-DE" sz="1600" kern="1200" dirty="0" err="1"/>
-            <a:t>to</a:t>
-          </a:r>
-          <a:r>
-            <a:rPr lang="de-DE" sz="1600" kern="1200" dirty="0"/>
-            <a:t> „</a:t>
-          </a:r>
-          <a:r>
-            <a:rPr lang="de-DE" sz="1600" kern="1200" dirty="0" err="1"/>
-            <a:t>runScenarios</a:t>
-          </a:r>
-          <a:r>
-            <a:rPr lang="de-DE" sz="1600" kern="1200" dirty="0"/>
-            <a:t>()“ </a:t>
-          </a:r>
-          <a:r>
-            <a:rPr lang="de-DE" sz="1600" kern="1200" dirty="0" err="1"/>
-            <a:t>function</a:t>
-          </a:r>
-          <a:r>
-            <a:rPr lang="de-DE" sz="1600" kern="1200" dirty="0"/>
-            <a:t> </a:t>
-          </a:r>
-          <a:r>
-            <a:rPr lang="de-DE" sz="1600" kern="1200" dirty="0" err="1"/>
-            <a:t>with</a:t>
-          </a:r>
-          <a:r>
-            <a:rPr lang="de-DE" sz="1600" kern="1200" dirty="0"/>
-            <a:t> </a:t>
-          </a:r>
-          <a:r>
-            <a:rPr lang="de-DE" sz="1600" kern="1200" dirty="0" err="1"/>
-            <a:t>the</a:t>
-          </a:r>
-          <a:r>
-            <a:rPr lang="de-DE" sz="1600" kern="1200" dirty="0"/>
-            <a:t> „</a:t>
-          </a:r>
-          <a:r>
-            <a:rPr lang="de-DE" sz="1600" kern="1200" dirty="0" err="1"/>
-            <a:t>customParams</a:t>
-          </a:r>
-          <a:r>
-            <a:rPr lang="de-DE" sz="1600" kern="1200" dirty="0"/>
-            <a:t>“ </a:t>
-          </a:r>
-          <a:r>
-            <a:rPr lang="de-DE" sz="1600" kern="1200" dirty="0" err="1"/>
-            <a:t>argument</a:t>
-          </a:r>
-          <a:endParaRPr lang="de-DE" sz="1600" kern="1200" dirty="0"/>
+            <a:t>Individual parameter values from „Individuals.xlsx“, if an individual is defined</a:t>
+          </a:r>
         </a:p>
       </dsp:txBody>
       <dsp:txXfrm>
-        <a:off x="2612909" y="4127657"/>
-        <a:ext cx="2902181" cy="857779"/>
+        <a:off x="2587509" y="3399065"/>
+        <a:ext cx="2952981" cy="705329"/>
       </dsp:txXfrm>
     </dsp:sp>
-    <dsp:sp modelId="{9BA57664-CD12-4F05-BF31-8399FF3938EE}">
+    <dsp:sp modelId="{018C7C0E-1BF5-4952-ACA5-977E53384722}">
       <dsp:nvSpPr>
         <dsp:cNvPr id="0" name=""/>
         <dsp:cNvSpPr/>
       </dsp:nvSpPr>
       <dsp:spPr>
         <a:xfrm rot="5400000">
-          <a:off x="3893158" y="5034903"/>
-          <a:ext cx="341682" cy="410019"/>
+          <a:off x="3923521" y="4145069"/>
+          <a:ext cx="280956" cy="337147"/>
         </a:xfrm>
         <a:prstGeom prst="rightArrow">
           <a:avLst>
@@ -6261,7 +6122,7 @@
         </a:bodyPr>
         <a:lstStyle/>
         <a:p>
-          <a:pPr marL="0" lvl="0" indent="0" algn="ctr" defTabSz="755650">
+          <a:pPr marL="0" lvl="0" indent="0" algn="ctr" defTabSz="1066800">
             <a:lnSpc>
               <a:spcPct val="90000"/>
             </a:lnSpc>
@@ -6273,23 +6134,23 @@
             </a:spcAft>
             <a:buNone/>
           </a:pPr>
-          <a:endParaRPr lang="en-US" sz="1700" kern="1200"/>
+          <a:endParaRPr lang="en-US" sz="2400" kern="1200"/>
         </a:p>
       </dsp:txBody>
       <dsp:txXfrm rot="-5400000">
-        <a:off x="3940994" y="5069072"/>
-        <a:ext cx="246011" cy="239177"/>
+        <a:off x="3962855" y="4173165"/>
+        <a:ext cx="202289" cy="196669"/>
       </dsp:txXfrm>
     </dsp:sp>
-    <dsp:sp modelId="{6F905638-7C0C-4414-A139-2B2E5BFB3BD8}">
+    <dsp:sp modelId="{585E7A7C-0464-4CE6-954B-DB59E1BB4AE8}">
       <dsp:nvSpPr>
         <dsp:cNvPr id="0" name=""/>
         <dsp:cNvSpPr/>
       </dsp:nvSpPr>
       <dsp:spPr>
         <a:xfrm>
-          <a:off x="2586222" y="5467701"/>
-          <a:ext cx="2955555" cy="911153"/>
+          <a:off x="2565565" y="4500947"/>
+          <a:ext cx="2996869" cy="749217"/>
         </a:xfrm>
         <a:prstGeom prst="roundRect">
           <a:avLst>
@@ -6333,12 +6194,12 @@
         </a:fontRef>
       </dsp:style>
       <dsp:txBody>
-        <a:bodyPr spcFirstLastPara="0" vert="horz" wrap="square" lIns="80010" tIns="80010" rIns="80010" bIns="80010" numCol="1" spcCol="1270" anchor="ctr" anchorCtr="0">
+        <a:bodyPr spcFirstLastPara="0" vert="horz" wrap="square" lIns="60960" tIns="60960" rIns="60960" bIns="60960" numCol="1" spcCol="1270" anchor="ctr" anchorCtr="0">
           <a:noAutofit/>
         </a:bodyPr>
         <a:lstStyle/>
         <a:p>
-          <a:pPr marL="0" lvl="0" indent="0" algn="ctr" defTabSz="933450">
+          <a:pPr marL="0" lvl="0" indent="0" algn="ctr" defTabSz="711200">
             <a:lnSpc>
               <a:spcPct val="90000"/>
             </a:lnSpc>
@@ -6351,43 +6212,165 @@
             <a:buNone/>
           </a:pPr>
           <a:r>
-            <a:rPr lang="de-DE" sz="2100" kern="1200" dirty="0"/>
-            <a:t>Parameters </a:t>
-          </a:r>
-          <a:r>
-            <a:rPr lang="de-DE" sz="2100" kern="1200" dirty="0" err="1"/>
-            <a:t>defined</a:t>
-          </a:r>
-          <a:r>
-            <a:rPr lang="de-DE" sz="2100" kern="1200" dirty="0"/>
-            <a:t> in </a:t>
-          </a:r>
-          <a:r>
-            <a:rPr lang="de-DE" sz="2100" kern="1200" dirty="0" err="1"/>
-            <a:t>the</a:t>
-          </a:r>
-          <a:r>
-            <a:rPr lang="de-DE" sz="2100" kern="1200" dirty="0"/>
-            <a:t> </a:t>
-          </a:r>
-          <a:r>
-            <a:rPr lang="de-DE" sz="2100" kern="1200" dirty="0" err="1"/>
-            <a:t>Application</a:t>
-          </a:r>
-          <a:r>
-            <a:rPr lang="de-DE" sz="2100" kern="1200" dirty="0"/>
-            <a:t> </a:t>
-          </a:r>
-          <a:r>
-            <a:rPr lang="de-DE" sz="2100" kern="1200" dirty="0" err="1"/>
-            <a:t>protocol</a:t>
-          </a:r>
-          <a:endParaRPr lang="de-DE" sz="2100" kern="1200" dirty="0"/>
+            <a:rPr lang="de-DE" sz="1600" kern="1200"/>
+            <a:t>Parameters defined in the Application protocol</a:t>
+          </a:r>
+          <a:endParaRPr lang="de-DE" sz="1600" kern="1200" dirty="0"/>
         </a:p>
       </dsp:txBody>
       <dsp:txXfrm>
-        <a:off x="2612909" y="5494388"/>
-        <a:ext cx="2902181" cy="857779"/>
+        <a:off x="2587509" y="4522891"/>
+        <a:ext cx="2952981" cy="705329"/>
+      </dsp:txXfrm>
+    </dsp:sp>
+    <dsp:sp modelId="{C73E5510-A645-4B66-BE03-8D62734B4D94}">
+      <dsp:nvSpPr>
+        <dsp:cNvPr id="0" name=""/>
+        <dsp:cNvSpPr/>
+      </dsp:nvSpPr>
+      <dsp:spPr>
+        <a:xfrm rot="5400000">
+          <a:off x="3923521" y="5268894"/>
+          <a:ext cx="280956" cy="337147"/>
+        </a:xfrm>
+        <a:prstGeom prst="rightArrow">
+          <a:avLst>
+            <a:gd name="adj1" fmla="val 60000"/>
+            <a:gd name="adj2" fmla="val 50000"/>
+          </a:avLst>
+        </a:prstGeom>
+        <a:solidFill>
+          <a:schemeClr val="accent1">
+            <a:tint val="60000"/>
+            <a:hueOff val="0"/>
+            <a:satOff val="0"/>
+            <a:lumOff val="0"/>
+            <a:alphaOff val="0"/>
+          </a:schemeClr>
+        </a:solidFill>
+        <a:ln>
+          <a:noFill/>
+        </a:ln>
+        <a:effectLst/>
+      </dsp:spPr>
+      <dsp:style>
+        <a:lnRef idx="0">
+          <a:scrgbClr r="0" g="0" b="0"/>
+        </a:lnRef>
+        <a:fillRef idx="1">
+          <a:scrgbClr r="0" g="0" b="0"/>
+        </a:fillRef>
+        <a:effectRef idx="0">
+          <a:scrgbClr r="0" g="0" b="0"/>
+        </a:effectRef>
+        <a:fontRef idx="minor">
+          <a:schemeClr val="lt1"/>
+        </a:fontRef>
+      </dsp:style>
+      <dsp:txBody>
+        <a:bodyPr spcFirstLastPara="0" vert="horz" wrap="square" lIns="0" tIns="0" rIns="0" bIns="0" numCol="1" spcCol="1270" anchor="ctr" anchorCtr="0">
+          <a:noAutofit/>
+        </a:bodyPr>
+        <a:lstStyle/>
+        <a:p>
+          <a:pPr marL="0" lvl="0" indent="0" algn="ctr" defTabSz="622300">
+            <a:lnSpc>
+              <a:spcPct val="90000"/>
+            </a:lnSpc>
+            <a:spcBef>
+              <a:spcPct val="0"/>
+            </a:spcBef>
+            <a:spcAft>
+              <a:spcPct val="35000"/>
+            </a:spcAft>
+            <a:buNone/>
+          </a:pPr>
+          <a:endParaRPr lang="en-DE" sz="1400" kern="1200"/>
+        </a:p>
+      </dsp:txBody>
+      <dsp:txXfrm rot="-5400000">
+        <a:off x="3962855" y="5296990"/>
+        <a:ext cx="202289" cy="196669"/>
+      </dsp:txXfrm>
+    </dsp:sp>
+    <dsp:sp modelId="{F76A027D-16C8-4857-90A5-3A8DF22F9B46}">
+      <dsp:nvSpPr>
+        <dsp:cNvPr id="0" name=""/>
+        <dsp:cNvSpPr/>
+      </dsp:nvSpPr>
+      <dsp:spPr>
+        <a:xfrm>
+          <a:off x="2565565" y="5624773"/>
+          <a:ext cx="2996869" cy="749217"/>
+        </a:xfrm>
+        <a:prstGeom prst="roundRect">
+          <a:avLst>
+            <a:gd name="adj" fmla="val 10000"/>
+          </a:avLst>
+        </a:prstGeom>
+        <a:solidFill>
+          <a:schemeClr val="accent1">
+            <a:hueOff val="0"/>
+            <a:satOff val="0"/>
+            <a:lumOff val="0"/>
+            <a:alphaOff val="0"/>
+          </a:schemeClr>
+        </a:solidFill>
+        <a:ln w="12700" cap="flat" cmpd="sng" algn="ctr">
+          <a:solidFill>
+            <a:schemeClr val="lt1">
+              <a:hueOff val="0"/>
+              <a:satOff val="0"/>
+              <a:lumOff val="0"/>
+              <a:alphaOff val="0"/>
+            </a:schemeClr>
+          </a:solidFill>
+          <a:prstDash val="solid"/>
+          <a:miter lim="800000"/>
+        </a:ln>
+        <a:effectLst/>
+      </dsp:spPr>
+      <dsp:style>
+        <a:lnRef idx="2">
+          <a:scrgbClr r="0" g="0" b="0"/>
+        </a:lnRef>
+        <a:fillRef idx="1">
+          <a:scrgbClr r="0" g="0" b="0"/>
+        </a:fillRef>
+        <a:effectRef idx="0">
+          <a:scrgbClr r="0" g="0" b="0"/>
+        </a:effectRef>
+        <a:fontRef idx="minor">
+          <a:schemeClr val="lt1"/>
+        </a:fontRef>
+      </dsp:style>
+      <dsp:txBody>
+        <a:bodyPr spcFirstLastPara="0" vert="horz" wrap="square" lIns="60960" tIns="60960" rIns="60960" bIns="60960" numCol="1" spcCol="1270" anchor="ctr" anchorCtr="0">
+          <a:noAutofit/>
+        </a:bodyPr>
+        <a:lstStyle/>
+        <a:p>
+          <a:pPr marL="0" lvl="0" indent="0" algn="ctr" defTabSz="711200">
+            <a:lnSpc>
+              <a:spcPct val="90000"/>
+            </a:lnSpc>
+            <a:spcBef>
+              <a:spcPct val="0"/>
+            </a:spcBef>
+            <a:spcAft>
+              <a:spcPct val="35000"/>
+            </a:spcAft>
+            <a:buNone/>
+          </a:pPr>
+          <a:r>
+            <a:rPr lang="de-DE" sz="1600" kern="1200" dirty="0"/>
+            <a:t>Parameters passed to the „createScenarios()“ function with the „customParams“ argument</a:t>
+          </a:r>
+        </a:p>
+      </dsp:txBody>
+      <dsp:txXfrm>
+        <a:off x="2587509" y="5646717"/>
+        <a:ext cx="2952981" cy="705329"/>
       </dsp:txXfrm>
     </dsp:sp>
   </dsp:spTree>
@@ -8991,7 +8974,7 @@
           <a:p>
             <a:fld id="{B199164D-C87C-46DA-8BA8-D57C4A9AE1EA}" type="datetimeFigureOut">
               <a:rPr lang="en-US" smtClean="0"/>
-              <a:t>4/26/2023</a:t>
+              <a:t>4/22/2025</a:t>
             </a:fld>
             <a:endParaRPr lang="en-US"/>
           </a:p>
@@ -9189,7 +9172,7 @@
           <a:p>
             <a:fld id="{B199164D-C87C-46DA-8BA8-D57C4A9AE1EA}" type="datetimeFigureOut">
               <a:rPr lang="en-US" smtClean="0"/>
-              <a:t>4/26/2023</a:t>
+              <a:t>4/22/2025</a:t>
             </a:fld>
             <a:endParaRPr lang="en-US"/>
           </a:p>
@@ -9397,7 +9380,7 @@
           <a:p>
             <a:fld id="{B199164D-C87C-46DA-8BA8-D57C4A9AE1EA}" type="datetimeFigureOut">
               <a:rPr lang="en-US" smtClean="0"/>
-              <a:t>4/26/2023</a:t>
+              <a:t>4/22/2025</a:t>
             </a:fld>
             <a:endParaRPr lang="en-US"/>
           </a:p>
@@ -9595,7 +9578,7 @@
           <a:p>
             <a:fld id="{B199164D-C87C-46DA-8BA8-D57C4A9AE1EA}" type="datetimeFigureOut">
               <a:rPr lang="en-US" smtClean="0"/>
-              <a:t>4/26/2023</a:t>
+              <a:t>4/22/2025</a:t>
             </a:fld>
             <a:endParaRPr lang="en-US"/>
           </a:p>
@@ -9870,7 +9853,7 @@
           <a:p>
             <a:fld id="{B199164D-C87C-46DA-8BA8-D57C4A9AE1EA}" type="datetimeFigureOut">
               <a:rPr lang="en-US" smtClean="0"/>
-              <a:t>4/26/2023</a:t>
+              <a:t>4/22/2025</a:t>
             </a:fld>
             <a:endParaRPr lang="en-US"/>
           </a:p>
@@ -10135,7 +10118,7 @@
           <a:p>
             <a:fld id="{B199164D-C87C-46DA-8BA8-D57C4A9AE1EA}" type="datetimeFigureOut">
               <a:rPr lang="en-US" smtClean="0"/>
-              <a:t>4/26/2023</a:t>
+              <a:t>4/22/2025</a:t>
             </a:fld>
             <a:endParaRPr lang="en-US"/>
           </a:p>
@@ -10547,7 +10530,7 @@
           <a:p>
             <a:fld id="{B199164D-C87C-46DA-8BA8-D57C4A9AE1EA}" type="datetimeFigureOut">
               <a:rPr lang="en-US" smtClean="0"/>
-              <a:t>4/26/2023</a:t>
+              <a:t>4/22/2025</a:t>
             </a:fld>
             <a:endParaRPr lang="en-US"/>
           </a:p>
@@ -10688,7 +10671,7 @@
           <a:p>
             <a:fld id="{B199164D-C87C-46DA-8BA8-D57C4A9AE1EA}" type="datetimeFigureOut">
               <a:rPr lang="en-US" smtClean="0"/>
-              <a:t>4/26/2023</a:t>
+              <a:t>4/22/2025</a:t>
             </a:fld>
             <a:endParaRPr lang="en-US"/>
           </a:p>
@@ -10801,7 +10784,7 @@
           <a:p>
             <a:fld id="{B199164D-C87C-46DA-8BA8-D57C4A9AE1EA}" type="datetimeFigureOut">
               <a:rPr lang="en-US" smtClean="0"/>
-              <a:t>4/26/2023</a:t>
+              <a:t>4/22/2025</a:t>
             </a:fld>
             <a:endParaRPr lang="en-US"/>
           </a:p>
@@ -11112,7 +11095,7 @@
           <a:p>
             <a:fld id="{B199164D-C87C-46DA-8BA8-D57C4A9AE1EA}" type="datetimeFigureOut">
               <a:rPr lang="en-US" smtClean="0"/>
-              <a:t>4/26/2023</a:t>
+              <a:t>4/22/2025</a:t>
             </a:fld>
             <a:endParaRPr lang="en-US"/>
           </a:p>
@@ -11400,7 +11383,7 @@
           <a:p>
             <a:fld id="{B199164D-C87C-46DA-8BA8-D57C4A9AE1EA}" type="datetimeFigureOut">
               <a:rPr lang="en-US" smtClean="0"/>
-              <a:t>4/26/2023</a:t>
+              <a:t>4/22/2025</a:t>
             </a:fld>
             <a:endParaRPr lang="en-US"/>
           </a:p>
@@ -11641,7 +11624,7 @@
           <a:p>
             <a:fld id="{B199164D-C87C-46DA-8BA8-D57C4A9AE1EA}" type="datetimeFigureOut">
               <a:rPr lang="en-US" smtClean="0"/>
-              <a:t>4/26/2023</a:t>
+              <a:t>4/22/2025</a:t>
             </a:fld>
             <a:endParaRPr lang="en-US"/>
           </a:p>
@@ -12603,7 +12586,7 @@
           <p:nvPr>
             <p:extLst>
               <p:ext uri="{D42A27DB-BD31-4B8C-83A1-F6EECF244321}">
-                <p14:modId xmlns:p14="http://schemas.microsoft.com/office/powerpoint/2010/main" val="4042890966"/>
+                <p14:modId xmlns:p14="http://schemas.microsoft.com/office/powerpoint/2010/main" val="1417592118"/>
               </p:ext>
             </p:extLst>
           </p:nvPr>

</xml_diff>

<commit_message>
- User-defined parameters passed to the `createScenarios()` or `Scenario$new()` (#818)
in the `customParams` argument are applied last. Up to this version, they
were overwritten by the administration protocol (\#817)

- Update vignette
- Update workflow scheme source (pptx)
- Remove not used figures from vignettes
</commit_message>
<xml_diff>
--- a/vignettes/Workflow_scheme.pptx
+++ b/vignettes/Workflow_scheme.pptx
@@ -3308,31 +3308,7 @@
         <a:p>
           <a:r>
             <a:rPr lang="de-DE" sz="1600" dirty="0"/>
-            <a:t>Individual </a:t>
-          </a:r>
-          <a:r>
-            <a:rPr lang="de-DE" sz="1600" dirty="0" err="1"/>
-            <a:t>parameter</a:t>
-          </a:r>
-          <a:r>
-            <a:rPr lang="de-DE" sz="1600" dirty="0"/>
-            <a:t> </a:t>
-          </a:r>
-          <a:r>
-            <a:rPr lang="de-DE" sz="1600" dirty="0" err="1"/>
-            <a:t>values</a:t>
-          </a:r>
-          <a:r>
-            <a:rPr lang="de-DE" sz="1600" dirty="0"/>
-            <a:t> </a:t>
-          </a:r>
-          <a:r>
-            <a:rPr lang="de-DE" sz="1600" dirty="0" err="1"/>
-            <a:t>from</a:t>
-          </a:r>
-          <a:r>
-            <a:rPr lang="de-DE" sz="1600" dirty="0"/>
-            <a:t> „Individuals.xlsx“</a:t>
+            <a:t>Individual parameter values from „Individuals.xlsx“, if an individual is defined</a:t>
           </a:r>
         </a:p>
       </dgm:t>
@@ -3359,7 +3335,7 @@
         </a:p>
       </dgm:t>
     </dgm:pt>
-    <dgm:pt modelId="{91FC2AB7-B1E8-4D87-AF6A-71E755A3CAA2}">
+    <dgm:pt modelId="{A0C5C029-8814-4D05-983D-3C336CF05814}">
       <dgm:prSet phldrT="[Text]" custT="1"/>
       <dgm:spPr/>
       <dgm:t>
@@ -3367,157 +3343,104 @@
         <a:lstStyle/>
         <a:p>
           <a:r>
-            <a:rPr lang="de-DE" sz="1600" dirty="0"/>
-            <a:t>Parameters </a:t>
-          </a:r>
-          <a:r>
-            <a:rPr lang="de-DE" sz="1600" dirty="0" err="1"/>
-            <a:t>passed</a:t>
-          </a:r>
-          <a:r>
-            <a:rPr lang="de-DE" sz="1600" dirty="0"/>
-            <a:t> </a:t>
-          </a:r>
-          <a:r>
-            <a:rPr lang="de-DE" sz="1600" dirty="0" err="1"/>
-            <a:t>to</a:t>
-          </a:r>
-          <a:r>
-            <a:rPr lang="de-DE" sz="1600" dirty="0"/>
-            <a:t> „</a:t>
-          </a:r>
-          <a:r>
-            <a:rPr lang="de-DE" sz="1600" dirty="0" err="1"/>
-            <a:t>runScenarios</a:t>
-          </a:r>
-          <a:r>
-            <a:rPr lang="de-DE" sz="1600" dirty="0"/>
-            <a:t>()“ </a:t>
-          </a:r>
-          <a:r>
-            <a:rPr lang="de-DE" sz="1600" dirty="0" err="1"/>
-            <a:t>function</a:t>
-          </a:r>
-          <a:r>
-            <a:rPr lang="de-DE" sz="1600" dirty="0"/>
-            <a:t> </a:t>
-          </a:r>
-          <a:r>
-            <a:rPr lang="de-DE" sz="1600" dirty="0" err="1"/>
-            <a:t>with</a:t>
-          </a:r>
-          <a:r>
-            <a:rPr lang="de-DE" sz="1600" dirty="0"/>
-            <a:t> </a:t>
-          </a:r>
-          <a:r>
-            <a:rPr lang="de-DE" sz="1600" dirty="0" err="1"/>
-            <a:t>the</a:t>
-          </a:r>
-          <a:r>
-            <a:rPr lang="de-DE" sz="1600" dirty="0"/>
-            <a:t> „</a:t>
-          </a:r>
-          <a:r>
-            <a:rPr lang="de-DE" sz="1600" dirty="0" err="1"/>
-            <a:t>customParams</a:t>
-          </a:r>
-          <a:r>
-            <a:rPr lang="de-DE" sz="1600" dirty="0"/>
-            <a:t>“ </a:t>
-          </a:r>
-          <a:r>
-            <a:rPr lang="de-DE" sz="1600" dirty="0" err="1"/>
-            <a:t>argument</a:t>
-          </a:r>
-          <a:endParaRPr lang="de-DE" sz="1600" dirty="0"/>
+            <a:rPr lang="en-US" sz="1600" dirty="0"/>
+            <a:t>Individual characteristics, if an individual is defined</a:t>
+          </a:r>
         </a:p>
       </dgm:t>
     </dgm:pt>
-    <dgm:pt modelId="{D6B86AE7-3792-458A-98FF-74E6B591785F}" type="parTrans" cxnId="{D66BDF65-AD23-4328-B996-97D85E65D8D4}">
+    <dgm:pt modelId="{A6C3C3CD-7001-44CB-9E24-37B705F127E6}" type="parTrans" cxnId="{A8188029-61BC-49CB-8114-8A7E5FE89283}">
       <dgm:prSet/>
       <dgm:spPr/>
       <dgm:t>
         <a:bodyPr/>
         <a:lstStyle/>
         <a:p>
-          <a:endParaRPr lang="en-US"/>
+          <a:endParaRPr lang="en-DE"/>
         </a:p>
       </dgm:t>
     </dgm:pt>
-    <dgm:pt modelId="{69FE11D4-A6F2-44FB-9706-14C29F2E3AC8}" type="sibTrans" cxnId="{D66BDF65-AD23-4328-B996-97D85E65D8D4}">
+    <dgm:pt modelId="{E2F0A844-DFCA-43A8-93A5-5779D57A51EF}" type="sibTrans" cxnId="{A8188029-61BC-49CB-8114-8A7E5FE89283}">
       <dgm:prSet/>
       <dgm:spPr/>
       <dgm:t>
         <a:bodyPr/>
         <a:lstStyle/>
         <a:p>
-          <a:endParaRPr lang="en-US"/>
+          <a:endParaRPr lang="en-DE"/>
         </a:p>
       </dgm:t>
     </dgm:pt>
-    <dgm:pt modelId="{904D13CF-20B5-45F7-B411-C4B04322AD45}">
-      <dgm:prSet phldrT="[Text]"/>
+    <dgm:pt modelId="{F13CC23B-9AAB-4F7E-9E46-D6709B9774C1}">
+      <dgm:prSet phldrT="[Text]" custT="1"/>
       <dgm:spPr/>
       <dgm:t>
         <a:bodyPr/>
         <a:lstStyle/>
         <a:p>
           <a:r>
-            <a:rPr lang="de-DE" sz="1400" dirty="0"/>
-            <a:t>Parameters </a:t>
-          </a:r>
-          <a:r>
-            <a:rPr lang="de-DE" sz="1400" dirty="0" err="1"/>
-            <a:t>defined</a:t>
-          </a:r>
-          <a:r>
-            <a:rPr lang="de-DE" sz="1400" dirty="0"/>
-            <a:t> in </a:t>
-          </a:r>
-          <a:r>
-            <a:rPr lang="de-DE" sz="1400" dirty="0" err="1"/>
-            <a:t>the</a:t>
-          </a:r>
-          <a:r>
-            <a:rPr lang="de-DE" sz="1400" dirty="0"/>
-            <a:t> </a:t>
-          </a:r>
-          <a:r>
-            <a:rPr lang="de-DE" sz="1400" dirty="0" err="1"/>
-            <a:t>Application</a:t>
-          </a:r>
-          <a:r>
-            <a:rPr lang="de-DE" sz="1400" dirty="0"/>
-            <a:t> </a:t>
-          </a:r>
-          <a:r>
-            <a:rPr lang="de-DE" sz="1400" dirty="0" err="1"/>
-            <a:t>protocol</a:t>
-          </a:r>
-          <a:endParaRPr lang="de-DE" sz="1400" dirty="0"/>
+            <a:rPr lang="de-DE" sz="1600"/>
+            <a:t>Parameters defined in the Application protocol</a:t>
+          </a:r>
+          <a:endParaRPr lang="de-DE" sz="1600" dirty="0"/>
         </a:p>
       </dgm:t>
     </dgm:pt>
-    <dgm:pt modelId="{99E8C748-AFDC-4A43-B7B7-8C9ABB77872B}" type="parTrans" cxnId="{6ED578E0-0714-4963-AC6F-BA4BCDA4DEDD}">
+    <dgm:pt modelId="{09B68A51-B666-4ABB-BBB8-D583B92E995A}" type="parTrans" cxnId="{DE53D022-C67B-4F16-AA93-433BFA29F44A}">
       <dgm:prSet/>
       <dgm:spPr/>
       <dgm:t>
         <a:bodyPr/>
         <a:lstStyle/>
         <a:p>
-          <a:endParaRPr lang="en-US"/>
+          <a:endParaRPr lang="en-DE"/>
         </a:p>
       </dgm:t>
     </dgm:pt>
-    <dgm:pt modelId="{E8F05EC8-AF1F-4FDC-91AE-4FAE4C0B9391}" type="sibTrans" cxnId="{6ED578E0-0714-4963-AC6F-BA4BCDA4DEDD}">
+    <dgm:pt modelId="{E980A61F-8A91-4B69-999C-58C9E8BBD0A0}" type="sibTrans" cxnId="{DE53D022-C67B-4F16-AA93-433BFA29F44A}">
       <dgm:prSet/>
       <dgm:spPr/>
       <dgm:t>
         <a:bodyPr/>
         <a:lstStyle/>
         <a:p>
-          <a:endParaRPr lang="en-US"/>
+          <a:endParaRPr lang="en-DE"/>
+        </a:p>
+      </dgm:t>
+    </dgm:pt>
+    <dgm:pt modelId="{4490C687-B1F7-4E90-B206-3A9A39BAEB07}">
+      <dgm:prSet phldrT="[Text]" custT="1"/>
+      <dgm:spPr/>
+      <dgm:t>
+        <a:bodyPr/>
+        <a:lstStyle/>
+        <a:p>
+          <a:r>
+            <a:rPr lang="de-DE" sz="1600" dirty="0"/>
+            <a:t>Parameters passed to the „createScenarios()“ function with the „customParams“ argument</a:t>
+          </a:r>
+        </a:p>
+      </dgm:t>
+    </dgm:pt>
+    <dgm:pt modelId="{2FF6F0DB-2230-46C8-B0E0-238730163B33}" type="parTrans" cxnId="{EB392511-DD32-44E2-90E1-0D4691569D5D}">
+      <dgm:prSet/>
+      <dgm:spPr/>
+      <dgm:t>
+        <a:bodyPr/>
+        <a:lstStyle/>
+        <a:p>
+          <a:endParaRPr lang="en-DE"/>
+        </a:p>
+      </dgm:t>
+    </dgm:pt>
+    <dgm:pt modelId="{8B7F2B9F-B5D3-4EAD-8D0A-8BFC79F57D33}" type="sibTrans" cxnId="{EB392511-DD32-44E2-90E1-0D4691569D5D}">
+      <dgm:prSet/>
+      <dgm:spPr/>
+      <dgm:t>
+        <a:bodyPr/>
+        <a:lstStyle/>
+        <a:p>
+          <a:endParaRPr lang="en-DE"/>
         </a:p>
       </dgm:t>
     </dgm:pt>
@@ -3530,7 +3453,7 @@
       <dgm:spPr/>
     </dgm:pt>
     <dgm:pt modelId="{32F3F580-B4AE-4A75-B4D5-199177EDC857}" type="pres">
-      <dgm:prSet presAssocID="{6E63DDAB-E0C7-493D-AA1D-876DA0421EBF}" presName="node" presStyleLbl="node1" presStyleIdx="0" presStyleCnt="5">
+      <dgm:prSet presAssocID="{6E63DDAB-E0C7-493D-AA1D-876DA0421EBF}" presName="node" presStyleLbl="node1" presStyleIdx="0" presStyleCnt="6">
         <dgm:presLayoutVars>
           <dgm:bulletEnabled val="1"/>
         </dgm:presLayoutVars>
@@ -3538,15 +3461,15 @@
       <dgm:spPr/>
     </dgm:pt>
     <dgm:pt modelId="{DE734AF0-F15D-43AA-9AA5-E7449D3D3242}" type="pres">
-      <dgm:prSet presAssocID="{0C0BF99E-58D0-4FAA-A800-B1F81FBC0008}" presName="sibTrans" presStyleLbl="sibTrans2D1" presStyleIdx="0" presStyleCnt="4"/>
+      <dgm:prSet presAssocID="{0C0BF99E-58D0-4FAA-A800-B1F81FBC0008}" presName="sibTrans" presStyleLbl="sibTrans2D1" presStyleIdx="0" presStyleCnt="5"/>
       <dgm:spPr/>
     </dgm:pt>
     <dgm:pt modelId="{5E1CEAA5-0423-4DCA-8EB1-AEC797E763EE}" type="pres">
-      <dgm:prSet presAssocID="{0C0BF99E-58D0-4FAA-A800-B1F81FBC0008}" presName="connectorText" presStyleLbl="sibTrans2D1" presStyleIdx="0" presStyleCnt="4"/>
+      <dgm:prSet presAssocID="{0C0BF99E-58D0-4FAA-A800-B1F81FBC0008}" presName="connectorText" presStyleLbl="sibTrans2D1" presStyleIdx="0" presStyleCnt="5"/>
       <dgm:spPr/>
     </dgm:pt>
     <dgm:pt modelId="{8DB52F31-1B42-4B55-A5C5-93099FA660CA}" type="pres">
-      <dgm:prSet presAssocID="{D9A164A5-C4EE-4E2C-BCB9-FC9B1367C8C9}" presName="node" presStyleLbl="node1" presStyleIdx="1" presStyleCnt="5">
+      <dgm:prSet presAssocID="{D9A164A5-C4EE-4E2C-BCB9-FC9B1367C8C9}" presName="node" presStyleLbl="node1" presStyleIdx="1" presStyleCnt="6">
         <dgm:presLayoutVars>
           <dgm:bulletEnabled val="1"/>
         </dgm:presLayoutVars>
@@ -3554,72 +3477,92 @@
       <dgm:spPr/>
     </dgm:pt>
     <dgm:pt modelId="{D4AF0274-1388-4F6B-8D53-52A6FED89246}" type="pres">
-      <dgm:prSet presAssocID="{3A3A765D-45CB-4909-B3B4-7B9C8089DBBE}" presName="sibTrans" presStyleLbl="sibTrans2D1" presStyleIdx="1" presStyleCnt="4"/>
+      <dgm:prSet presAssocID="{3A3A765D-45CB-4909-B3B4-7B9C8089DBBE}" presName="sibTrans" presStyleLbl="sibTrans2D1" presStyleIdx="1" presStyleCnt="5"/>
       <dgm:spPr/>
     </dgm:pt>
     <dgm:pt modelId="{FA84D1E7-8CF9-4F3E-B109-DBB564D82884}" type="pres">
-      <dgm:prSet presAssocID="{3A3A765D-45CB-4909-B3B4-7B9C8089DBBE}" presName="connectorText" presStyleLbl="sibTrans2D1" presStyleIdx="1" presStyleCnt="4"/>
-      <dgm:spPr/>
-    </dgm:pt>
-    <dgm:pt modelId="{393E3C96-C34C-451A-92F8-886DD2CD2B93}" type="pres">
-      <dgm:prSet presAssocID="{0EA7596A-34F1-4CE4-AD46-2937F6D05F61}" presName="node" presStyleLbl="node1" presStyleIdx="2" presStyleCnt="5">
+      <dgm:prSet presAssocID="{3A3A765D-45CB-4909-B3B4-7B9C8089DBBE}" presName="connectorText" presStyleLbl="sibTrans2D1" presStyleIdx="1" presStyleCnt="5"/>
+      <dgm:spPr/>
+    </dgm:pt>
+    <dgm:pt modelId="{C625C72E-DFBD-4936-871E-23CCDB1E26A3}" type="pres">
+      <dgm:prSet presAssocID="{A0C5C029-8814-4D05-983D-3C336CF05814}" presName="node" presStyleLbl="node1" presStyleIdx="2" presStyleCnt="6">
         <dgm:presLayoutVars>
           <dgm:bulletEnabled val="1"/>
         </dgm:presLayoutVars>
       </dgm:prSet>
       <dgm:spPr/>
     </dgm:pt>
-    <dgm:pt modelId="{018C7C0E-1BF5-4952-ACA5-977E53384722}" type="pres">
-      <dgm:prSet presAssocID="{E3006435-1BF9-4FD6-9C31-7ED4490DE600}" presName="sibTrans" presStyleLbl="sibTrans2D1" presStyleIdx="2" presStyleCnt="4"/>
-      <dgm:spPr/>
-    </dgm:pt>
-    <dgm:pt modelId="{9A6F0891-C47C-4E2B-BFC4-7050A71F9598}" type="pres">
-      <dgm:prSet presAssocID="{E3006435-1BF9-4FD6-9C31-7ED4490DE600}" presName="connectorText" presStyleLbl="sibTrans2D1" presStyleIdx="2" presStyleCnt="4"/>
-      <dgm:spPr/>
-    </dgm:pt>
-    <dgm:pt modelId="{164DDEB3-DF6D-4D8A-AB77-57CE925C2E9F}" type="pres">
-      <dgm:prSet presAssocID="{91FC2AB7-B1E8-4D87-AF6A-71E755A3CAA2}" presName="node" presStyleLbl="node1" presStyleIdx="3" presStyleCnt="5">
+    <dgm:pt modelId="{CF86FC70-012F-40D6-8B9A-48484735C015}" type="pres">
+      <dgm:prSet presAssocID="{E2F0A844-DFCA-43A8-93A5-5779D57A51EF}" presName="sibTrans" presStyleLbl="sibTrans2D1" presStyleIdx="2" presStyleCnt="5"/>
+      <dgm:spPr/>
+    </dgm:pt>
+    <dgm:pt modelId="{171439AC-6B75-4B79-9606-CFF53C964BC7}" type="pres">
+      <dgm:prSet presAssocID="{E2F0A844-DFCA-43A8-93A5-5779D57A51EF}" presName="connectorText" presStyleLbl="sibTrans2D1" presStyleIdx="2" presStyleCnt="5"/>
+      <dgm:spPr/>
+    </dgm:pt>
+    <dgm:pt modelId="{393E3C96-C34C-451A-92F8-886DD2CD2B93}" type="pres">
+      <dgm:prSet presAssocID="{0EA7596A-34F1-4CE4-AD46-2937F6D05F61}" presName="node" presStyleLbl="node1" presStyleIdx="3" presStyleCnt="6">
         <dgm:presLayoutVars>
           <dgm:bulletEnabled val="1"/>
         </dgm:presLayoutVars>
       </dgm:prSet>
       <dgm:spPr/>
     </dgm:pt>
-    <dgm:pt modelId="{9BA57664-CD12-4F05-BF31-8399FF3938EE}" type="pres">
-      <dgm:prSet presAssocID="{69FE11D4-A6F2-44FB-9706-14C29F2E3AC8}" presName="sibTrans" presStyleLbl="sibTrans2D1" presStyleIdx="3" presStyleCnt="4"/>
-      <dgm:spPr/>
-    </dgm:pt>
-    <dgm:pt modelId="{C5DEC020-9475-4AE8-B5C4-B31F7E4BC4BF}" type="pres">
-      <dgm:prSet presAssocID="{69FE11D4-A6F2-44FB-9706-14C29F2E3AC8}" presName="connectorText" presStyleLbl="sibTrans2D1" presStyleIdx="3" presStyleCnt="4"/>
-      <dgm:spPr/>
-    </dgm:pt>
-    <dgm:pt modelId="{6F905638-7C0C-4414-A139-2B2E5BFB3BD8}" type="pres">
-      <dgm:prSet presAssocID="{904D13CF-20B5-45F7-B411-C4B04322AD45}" presName="node" presStyleLbl="node1" presStyleIdx="4" presStyleCnt="5">
+    <dgm:pt modelId="{018C7C0E-1BF5-4952-ACA5-977E53384722}" type="pres">
+      <dgm:prSet presAssocID="{E3006435-1BF9-4FD6-9C31-7ED4490DE600}" presName="sibTrans" presStyleLbl="sibTrans2D1" presStyleIdx="3" presStyleCnt="5"/>
+      <dgm:spPr/>
+    </dgm:pt>
+    <dgm:pt modelId="{9A6F0891-C47C-4E2B-BFC4-7050A71F9598}" type="pres">
+      <dgm:prSet presAssocID="{E3006435-1BF9-4FD6-9C31-7ED4490DE600}" presName="connectorText" presStyleLbl="sibTrans2D1" presStyleIdx="3" presStyleCnt="5"/>
+      <dgm:spPr/>
+    </dgm:pt>
+    <dgm:pt modelId="{585E7A7C-0464-4CE6-954B-DB59E1BB4AE8}" type="pres">
+      <dgm:prSet presAssocID="{F13CC23B-9AAB-4F7E-9E46-D6709B9774C1}" presName="node" presStyleLbl="node1" presStyleIdx="4" presStyleCnt="6">
         <dgm:presLayoutVars>
           <dgm:bulletEnabled val="1"/>
         </dgm:presLayoutVars>
       </dgm:prSet>
       <dgm:spPr/>
     </dgm:pt>
+    <dgm:pt modelId="{C73E5510-A645-4B66-BE03-8D62734B4D94}" type="pres">
+      <dgm:prSet presAssocID="{E980A61F-8A91-4B69-999C-58C9E8BBD0A0}" presName="sibTrans" presStyleLbl="sibTrans2D1" presStyleIdx="4" presStyleCnt="5"/>
+      <dgm:spPr/>
+    </dgm:pt>
+    <dgm:pt modelId="{D3E31B5D-53E9-4C54-9BC8-CF6E93FDE636}" type="pres">
+      <dgm:prSet presAssocID="{E980A61F-8A91-4B69-999C-58C9E8BBD0A0}" presName="connectorText" presStyleLbl="sibTrans2D1" presStyleIdx="4" presStyleCnt="5"/>
+      <dgm:spPr/>
+    </dgm:pt>
+    <dgm:pt modelId="{F76A027D-16C8-4857-90A5-3A8DF22F9B46}" type="pres">
+      <dgm:prSet presAssocID="{4490C687-B1F7-4E90-B206-3A9A39BAEB07}" presName="node" presStyleLbl="node1" presStyleIdx="5" presStyleCnt="6">
+        <dgm:presLayoutVars>
+          <dgm:bulletEnabled val="1"/>
+        </dgm:presLayoutVars>
+      </dgm:prSet>
+      <dgm:spPr/>
+    </dgm:pt>
   </dgm:ptLst>
   <dgm:cxnLst>
     <dgm:cxn modelId="{F97F7400-5F3F-4511-99AF-C09BD42FD039}" type="presOf" srcId="{E3006435-1BF9-4FD6-9C31-7ED4490DE600}" destId="{9A6F0891-C47C-4E2B-BFC4-7050A71F9598}" srcOrd="1" destOrd="0" presId="urn:microsoft.com/office/officeart/2005/8/layout/process2"/>
-    <dgm:cxn modelId="{DD444703-08F9-4BBF-AC2A-0976E6EAA556}" srcId="{4C6B6F34-EBF2-438E-B3B7-957DBAF6DA06}" destId="{0EA7596A-34F1-4CE4-AD46-2937F6D05F61}" srcOrd="2" destOrd="0" parTransId="{F43BB90B-B156-42E6-9B7C-9F90F9B30A68}" sibTransId="{E3006435-1BF9-4FD6-9C31-7ED4490DE600}"/>
+    <dgm:cxn modelId="{DD444703-08F9-4BBF-AC2A-0976E6EAA556}" srcId="{4C6B6F34-EBF2-438E-B3B7-957DBAF6DA06}" destId="{0EA7596A-34F1-4CE4-AD46-2937F6D05F61}" srcOrd="3" destOrd="0" parTransId="{F43BB90B-B156-42E6-9B7C-9F90F9B30A68}" sibTransId="{E3006435-1BF9-4FD6-9C31-7ED4490DE600}"/>
     <dgm:cxn modelId="{085A1E0C-FAE9-4517-BEB5-3719AAFE0535}" type="presOf" srcId="{3A3A765D-45CB-4909-B3B4-7B9C8089DBBE}" destId="{D4AF0274-1388-4F6B-8D53-52A6FED89246}" srcOrd="0" destOrd="0" presId="urn:microsoft.com/office/officeart/2005/8/layout/process2"/>
+    <dgm:cxn modelId="{EB392511-DD32-44E2-90E1-0D4691569D5D}" srcId="{4C6B6F34-EBF2-438E-B3B7-957DBAF6DA06}" destId="{4490C687-B1F7-4E90-B206-3A9A39BAEB07}" srcOrd="5" destOrd="0" parTransId="{2FF6F0DB-2230-46C8-B0E0-238730163B33}" sibTransId="{8B7F2B9F-B5D3-4EAD-8D0A-8BFC79F57D33}"/>
+    <dgm:cxn modelId="{DE53D022-C67B-4F16-AA93-433BFA29F44A}" srcId="{4C6B6F34-EBF2-438E-B3B7-957DBAF6DA06}" destId="{F13CC23B-9AAB-4F7E-9E46-D6709B9774C1}" srcOrd="4" destOrd="0" parTransId="{09B68A51-B666-4ABB-BBB8-D583B92E995A}" sibTransId="{E980A61F-8A91-4B69-999C-58C9E8BBD0A0}"/>
     <dgm:cxn modelId="{58FFE822-79DD-45BE-A39D-0AEC2D33D243}" type="presOf" srcId="{D9A164A5-C4EE-4E2C-BCB9-FC9B1367C8C9}" destId="{8DB52F31-1B42-4B55-A5C5-93099FA660CA}" srcOrd="0" destOrd="0" presId="urn:microsoft.com/office/officeart/2005/8/layout/process2"/>
+    <dgm:cxn modelId="{A8188029-61BC-49CB-8114-8A7E5FE89283}" srcId="{4C6B6F34-EBF2-438E-B3B7-957DBAF6DA06}" destId="{A0C5C029-8814-4D05-983D-3C336CF05814}" srcOrd="2" destOrd="0" parTransId="{A6C3C3CD-7001-44CB-9E24-37B705F127E6}" sibTransId="{E2F0A844-DFCA-43A8-93A5-5779D57A51EF}"/>
     <dgm:cxn modelId="{3B417F30-F813-4EA9-B108-43EF204F7770}" type="presOf" srcId="{0C0BF99E-58D0-4FAA-A800-B1F81FBC0008}" destId="{DE734AF0-F15D-43AA-9AA5-E7449D3D3242}" srcOrd="0" destOrd="0" presId="urn:microsoft.com/office/officeart/2005/8/layout/process2"/>
     <dgm:cxn modelId="{F0B6D332-99FB-4164-A8B7-AB0DED1125E0}" srcId="{4C6B6F34-EBF2-438E-B3B7-957DBAF6DA06}" destId="{6E63DDAB-E0C7-493D-AA1D-876DA0421EBF}" srcOrd="0" destOrd="0" parTransId="{0F29EA39-47A9-456B-B289-6276254019D4}" sibTransId="{0C0BF99E-58D0-4FAA-A800-B1F81FBC0008}"/>
-    <dgm:cxn modelId="{7DF06565-05CB-4B0F-BBA8-F00B84787873}" type="presOf" srcId="{91FC2AB7-B1E8-4D87-AF6A-71E755A3CAA2}" destId="{164DDEB3-DF6D-4D8A-AB77-57CE925C2E9F}" srcOrd="0" destOrd="0" presId="urn:microsoft.com/office/officeart/2005/8/layout/process2"/>
-    <dgm:cxn modelId="{D66BDF65-AD23-4328-B996-97D85E65D8D4}" srcId="{4C6B6F34-EBF2-438E-B3B7-957DBAF6DA06}" destId="{91FC2AB7-B1E8-4D87-AF6A-71E755A3CAA2}" srcOrd="3" destOrd="0" parTransId="{D6B86AE7-3792-458A-98FF-74E6B591785F}" sibTransId="{69FE11D4-A6F2-44FB-9706-14C29F2E3AC8}"/>
+    <dgm:cxn modelId="{0040AF68-B5FD-4FA5-8E9E-AA0B8D4673AC}" type="presOf" srcId="{4490C687-B1F7-4E90-B206-3A9A39BAEB07}" destId="{F76A027D-16C8-4857-90A5-3A8DF22F9B46}" srcOrd="0" destOrd="0" presId="urn:microsoft.com/office/officeart/2005/8/layout/process2"/>
+    <dgm:cxn modelId="{F7C1D348-BC8A-45FB-A0E3-0CC82DACE7F9}" type="presOf" srcId="{F13CC23B-9AAB-4F7E-9E46-D6709B9774C1}" destId="{585E7A7C-0464-4CE6-954B-DB59E1BB4AE8}" srcOrd="0" destOrd="0" presId="urn:microsoft.com/office/officeart/2005/8/layout/process2"/>
+    <dgm:cxn modelId="{2723FF6A-D170-44AD-8BFB-F1393EA30F54}" type="presOf" srcId="{E2F0A844-DFCA-43A8-93A5-5779D57A51EF}" destId="{171439AC-6B75-4B79-9606-CFF53C964BC7}" srcOrd="1" destOrd="0" presId="urn:microsoft.com/office/officeart/2005/8/layout/process2"/>
     <dgm:cxn modelId="{041BE877-F74B-4506-8223-BAA0514CDF4F}" type="presOf" srcId="{4C6B6F34-EBF2-438E-B3B7-957DBAF6DA06}" destId="{0F8C4796-60B9-44F0-95F7-C8F53E0D6F5B}" srcOrd="0" destOrd="0" presId="urn:microsoft.com/office/officeart/2005/8/layout/process2"/>
-    <dgm:cxn modelId="{9505A47A-7635-4F9C-ACDD-8AAC4600A121}" type="presOf" srcId="{69FE11D4-A6F2-44FB-9706-14C29F2E3AC8}" destId="{C5DEC020-9475-4AE8-B5C4-B31F7E4BC4BF}" srcOrd="1" destOrd="0" presId="urn:microsoft.com/office/officeart/2005/8/layout/process2"/>
     <dgm:cxn modelId="{13FCCE7E-9669-4D5E-95D5-2B01BD92A353}" type="presOf" srcId="{0C0BF99E-58D0-4FAA-A800-B1F81FBC0008}" destId="{5E1CEAA5-0423-4DCA-8EB1-AEC797E763EE}" srcOrd="1" destOrd="0" presId="urn:microsoft.com/office/officeart/2005/8/layout/process2"/>
+    <dgm:cxn modelId="{87EC20A0-4BEC-49F1-83C1-DA9395FADF3D}" type="presOf" srcId="{E980A61F-8A91-4B69-999C-58C9E8BBD0A0}" destId="{C73E5510-A645-4B66-BE03-8D62734B4D94}" srcOrd="0" destOrd="0" presId="urn:microsoft.com/office/officeart/2005/8/layout/process2"/>
+    <dgm:cxn modelId="{7FB661A7-200E-4228-AC39-4537EB67B512}" type="presOf" srcId="{A0C5C029-8814-4D05-983D-3C336CF05814}" destId="{C625C72E-DFBD-4936-871E-23CCDB1E26A3}" srcOrd="0" destOrd="0" presId="urn:microsoft.com/office/officeart/2005/8/layout/process2"/>
+    <dgm:cxn modelId="{66E811B9-8D54-4C79-AF42-257D01D27DDE}" type="presOf" srcId="{E2F0A844-DFCA-43A8-93A5-5779D57A51EF}" destId="{CF86FC70-012F-40D6-8B9A-48484735C015}" srcOrd="0" destOrd="0" presId="urn:microsoft.com/office/officeart/2005/8/layout/process2"/>
     <dgm:cxn modelId="{727F38CF-C7C3-47A9-8F05-5B2A08850324}" type="presOf" srcId="{E3006435-1BF9-4FD6-9C31-7ED4490DE600}" destId="{018C7C0E-1BF5-4952-ACA5-977E53384722}" srcOrd="0" destOrd="0" presId="urn:microsoft.com/office/officeart/2005/8/layout/process2"/>
     <dgm:cxn modelId="{9DDAD1D2-B693-448D-AA4B-57AF44DAAFE5}" type="presOf" srcId="{3A3A765D-45CB-4909-B3B4-7B9C8089DBBE}" destId="{FA84D1E7-8CF9-4F3E-B109-DBB564D82884}" srcOrd="1" destOrd="0" presId="urn:microsoft.com/office/officeart/2005/8/layout/process2"/>
-    <dgm:cxn modelId="{0642FAD5-29D0-4E72-AB17-3364D2E947FE}" type="presOf" srcId="{904D13CF-20B5-45F7-B411-C4B04322AD45}" destId="{6F905638-7C0C-4414-A139-2B2E5BFB3BD8}" srcOrd="0" destOrd="0" presId="urn:microsoft.com/office/officeart/2005/8/layout/process2"/>
-    <dgm:cxn modelId="{6ED578E0-0714-4963-AC6F-BA4BCDA4DEDD}" srcId="{4C6B6F34-EBF2-438E-B3B7-957DBAF6DA06}" destId="{904D13CF-20B5-45F7-B411-C4B04322AD45}" srcOrd="4" destOrd="0" parTransId="{99E8C748-AFDC-4A43-B7B7-8C9ABB77872B}" sibTransId="{E8F05EC8-AF1F-4FDC-91AE-4FAE4C0B9391}"/>
     <dgm:cxn modelId="{84DA56E3-F24E-4F53-AD97-DB23D066A087}" type="presOf" srcId="{0EA7596A-34F1-4CE4-AD46-2937F6D05F61}" destId="{393E3C96-C34C-451A-92F8-886DD2CD2B93}" srcOrd="0" destOrd="0" presId="urn:microsoft.com/office/officeart/2005/8/layout/process2"/>
-    <dgm:cxn modelId="{5D3071EB-87D3-4049-85C8-C8C2CA8C9DA1}" type="presOf" srcId="{69FE11D4-A6F2-44FB-9706-14C29F2E3AC8}" destId="{9BA57664-CD12-4F05-BF31-8399FF3938EE}" srcOrd="0" destOrd="0" presId="urn:microsoft.com/office/officeart/2005/8/layout/process2"/>
+    <dgm:cxn modelId="{D19017EA-7715-4F13-8809-944C75CE336A}" type="presOf" srcId="{E980A61F-8A91-4B69-999C-58C9E8BBD0A0}" destId="{D3E31B5D-53E9-4C54-9BC8-CF6E93FDE636}" srcOrd="1" destOrd="0" presId="urn:microsoft.com/office/officeart/2005/8/layout/process2"/>
     <dgm:cxn modelId="{923B37EE-D128-4A8A-84A7-FA079699B387}" type="presOf" srcId="{6E63DDAB-E0C7-493D-AA1D-876DA0421EBF}" destId="{32F3F580-B4AE-4A75-B4D5-199177EDC857}" srcOrd="0" destOrd="0" presId="urn:microsoft.com/office/officeart/2005/8/layout/process2"/>
     <dgm:cxn modelId="{256209F6-6CBC-4B7E-B7FD-2B6C071D798B}" srcId="{4C6B6F34-EBF2-438E-B3B7-957DBAF6DA06}" destId="{D9A164A5-C4EE-4E2C-BCB9-FC9B1367C8C9}" srcOrd="1" destOrd="0" parTransId="{4AA0B12F-FC0A-441A-8E6D-B24937D51028}" sibTransId="{3A3A765D-45CB-4909-B3B4-7B9C8089DBBE}"/>
     <dgm:cxn modelId="{2FF728A6-324E-4371-9CF3-A0D616AD4A9D}" type="presParOf" srcId="{0F8C4796-60B9-44F0-95F7-C8F53E0D6F5B}" destId="{32F3F580-B4AE-4A75-B4D5-199177EDC857}" srcOrd="0" destOrd="0" presId="urn:microsoft.com/office/officeart/2005/8/layout/process2"/>
@@ -3628,13 +3571,16 @@
     <dgm:cxn modelId="{827B7235-439D-465C-821B-D95D0345666A}" type="presParOf" srcId="{0F8C4796-60B9-44F0-95F7-C8F53E0D6F5B}" destId="{8DB52F31-1B42-4B55-A5C5-93099FA660CA}" srcOrd="2" destOrd="0" presId="urn:microsoft.com/office/officeart/2005/8/layout/process2"/>
     <dgm:cxn modelId="{41DA6530-C161-4E04-BE6A-9C4D956745B1}" type="presParOf" srcId="{0F8C4796-60B9-44F0-95F7-C8F53E0D6F5B}" destId="{D4AF0274-1388-4F6B-8D53-52A6FED89246}" srcOrd="3" destOrd="0" presId="urn:microsoft.com/office/officeart/2005/8/layout/process2"/>
     <dgm:cxn modelId="{B5B52E67-525C-400A-B349-2AA336FEC8CE}" type="presParOf" srcId="{D4AF0274-1388-4F6B-8D53-52A6FED89246}" destId="{FA84D1E7-8CF9-4F3E-B109-DBB564D82884}" srcOrd="0" destOrd="0" presId="urn:microsoft.com/office/officeart/2005/8/layout/process2"/>
-    <dgm:cxn modelId="{9DD2B436-5F21-4E06-AEA8-F4763CC1FC3A}" type="presParOf" srcId="{0F8C4796-60B9-44F0-95F7-C8F53E0D6F5B}" destId="{393E3C96-C34C-451A-92F8-886DD2CD2B93}" srcOrd="4" destOrd="0" presId="urn:microsoft.com/office/officeart/2005/8/layout/process2"/>
-    <dgm:cxn modelId="{079CEB64-8379-4B4B-8CD1-1E1313245DFE}" type="presParOf" srcId="{0F8C4796-60B9-44F0-95F7-C8F53E0D6F5B}" destId="{018C7C0E-1BF5-4952-ACA5-977E53384722}" srcOrd="5" destOrd="0" presId="urn:microsoft.com/office/officeart/2005/8/layout/process2"/>
+    <dgm:cxn modelId="{CDE239E8-F249-4C93-8B9E-546532C0759F}" type="presParOf" srcId="{0F8C4796-60B9-44F0-95F7-C8F53E0D6F5B}" destId="{C625C72E-DFBD-4936-871E-23CCDB1E26A3}" srcOrd="4" destOrd="0" presId="urn:microsoft.com/office/officeart/2005/8/layout/process2"/>
+    <dgm:cxn modelId="{463B7151-207A-408B-9A5B-80B20777A94A}" type="presParOf" srcId="{0F8C4796-60B9-44F0-95F7-C8F53E0D6F5B}" destId="{CF86FC70-012F-40D6-8B9A-48484735C015}" srcOrd="5" destOrd="0" presId="urn:microsoft.com/office/officeart/2005/8/layout/process2"/>
+    <dgm:cxn modelId="{08DAAA28-23F9-4A11-8100-705B23AE15B6}" type="presParOf" srcId="{CF86FC70-012F-40D6-8B9A-48484735C015}" destId="{171439AC-6B75-4B79-9606-CFF53C964BC7}" srcOrd="0" destOrd="0" presId="urn:microsoft.com/office/officeart/2005/8/layout/process2"/>
+    <dgm:cxn modelId="{9DD2B436-5F21-4E06-AEA8-F4763CC1FC3A}" type="presParOf" srcId="{0F8C4796-60B9-44F0-95F7-C8F53E0D6F5B}" destId="{393E3C96-C34C-451A-92F8-886DD2CD2B93}" srcOrd="6" destOrd="0" presId="urn:microsoft.com/office/officeart/2005/8/layout/process2"/>
+    <dgm:cxn modelId="{079CEB64-8379-4B4B-8CD1-1E1313245DFE}" type="presParOf" srcId="{0F8C4796-60B9-44F0-95F7-C8F53E0D6F5B}" destId="{018C7C0E-1BF5-4952-ACA5-977E53384722}" srcOrd="7" destOrd="0" presId="urn:microsoft.com/office/officeart/2005/8/layout/process2"/>
     <dgm:cxn modelId="{E2AEF74D-31B1-451D-9D8E-B03F88929D0F}" type="presParOf" srcId="{018C7C0E-1BF5-4952-ACA5-977E53384722}" destId="{9A6F0891-C47C-4E2B-BFC4-7050A71F9598}" srcOrd="0" destOrd="0" presId="urn:microsoft.com/office/officeart/2005/8/layout/process2"/>
-    <dgm:cxn modelId="{35376DAD-FC46-484D-94CE-3EC64D85CACF}" type="presParOf" srcId="{0F8C4796-60B9-44F0-95F7-C8F53E0D6F5B}" destId="{164DDEB3-DF6D-4D8A-AB77-57CE925C2E9F}" srcOrd="6" destOrd="0" presId="urn:microsoft.com/office/officeart/2005/8/layout/process2"/>
-    <dgm:cxn modelId="{B8FDD49C-5E2A-4F63-BD96-A33F796A894A}" type="presParOf" srcId="{0F8C4796-60B9-44F0-95F7-C8F53E0D6F5B}" destId="{9BA57664-CD12-4F05-BF31-8399FF3938EE}" srcOrd="7" destOrd="0" presId="urn:microsoft.com/office/officeart/2005/8/layout/process2"/>
-    <dgm:cxn modelId="{FEA80009-8437-40D8-A756-FAEC93C34A2D}" type="presParOf" srcId="{9BA57664-CD12-4F05-BF31-8399FF3938EE}" destId="{C5DEC020-9475-4AE8-B5C4-B31F7E4BC4BF}" srcOrd="0" destOrd="0" presId="urn:microsoft.com/office/officeart/2005/8/layout/process2"/>
-    <dgm:cxn modelId="{2135BFA1-8F37-4129-84FB-B2C5E959083D}" type="presParOf" srcId="{0F8C4796-60B9-44F0-95F7-C8F53E0D6F5B}" destId="{6F905638-7C0C-4414-A139-2B2E5BFB3BD8}" srcOrd="8" destOrd="0" presId="urn:microsoft.com/office/officeart/2005/8/layout/process2"/>
+    <dgm:cxn modelId="{0E2E67D8-67D0-41B0-BB7A-CBFE6B235848}" type="presParOf" srcId="{0F8C4796-60B9-44F0-95F7-C8F53E0D6F5B}" destId="{585E7A7C-0464-4CE6-954B-DB59E1BB4AE8}" srcOrd="8" destOrd="0" presId="urn:microsoft.com/office/officeart/2005/8/layout/process2"/>
+    <dgm:cxn modelId="{87EAC614-5DFA-45A0-9CD2-0F9E8042F42A}" type="presParOf" srcId="{0F8C4796-60B9-44F0-95F7-C8F53E0D6F5B}" destId="{C73E5510-A645-4B66-BE03-8D62734B4D94}" srcOrd="9" destOrd="0" presId="urn:microsoft.com/office/officeart/2005/8/layout/process2"/>
+    <dgm:cxn modelId="{099D4C04-B717-485F-8B57-499FC9147F8F}" type="presParOf" srcId="{C73E5510-A645-4B66-BE03-8D62734B4D94}" destId="{D3E31B5D-53E9-4C54-9BC8-CF6E93FDE636}" srcOrd="0" destOrd="0" presId="urn:microsoft.com/office/officeart/2005/8/layout/process2"/>
+    <dgm:cxn modelId="{4C7F9B42-964D-4DDA-8BF4-0E0043203657}" type="presParOf" srcId="{0F8C4796-60B9-44F0-95F7-C8F53E0D6F5B}" destId="{F76A027D-16C8-4857-90A5-3A8DF22F9B46}" srcOrd="10" destOrd="0" presId="urn:microsoft.com/office/officeart/2005/8/layout/process2"/>
   </dgm:cxnLst>
   <dgm:bg/>
   <dgm:whole/>
@@ -5533,8 +5479,8 @@
       </dsp:nvSpPr>
       <dsp:spPr>
         <a:xfrm>
-          <a:off x="2586222" y="778"/>
-          <a:ext cx="2955555" cy="911153"/>
+          <a:off x="2565565" y="5643"/>
+          <a:ext cx="2996869" cy="749217"/>
         </a:xfrm>
         <a:prstGeom prst="roundRect">
           <a:avLst>
@@ -5611,8 +5557,8 @@
         </a:p>
       </dsp:txBody>
       <dsp:txXfrm>
-        <a:off x="2612909" y="27465"/>
-        <a:ext cx="2902181" cy="857779"/>
+        <a:off x="2587509" y="27587"/>
+        <a:ext cx="2952981" cy="705329"/>
       </dsp:txXfrm>
     </dsp:sp>
     <dsp:sp modelId="{DE734AF0-F15D-43AA-9AA5-E7449D3D3242}">
@@ -5622,8 +5568,8 @@
       </dsp:nvSpPr>
       <dsp:spPr>
         <a:xfrm rot="5400000">
-          <a:off x="3893158" y="934711"/>
-          <a:ext cx="341682" cy="410019"/>
+          <a:off x="3923521" y="773591"/>
+          <a:ext cx="280956" cy="337147"/>
         </a:xfrm>
         <a:prstGeom prst="rightArrow">
           <a:avLst>
@@ -5681,8 +5627,8 @@
         </a:p>
       </dsp:txBody>
       <dsp:txXfrm rot="-5400000">
-        <a:off x="3940994" y="968880"/>
-        <a:ext cx="246011" cy="239177"/>
+        <a:off x="3962855" y="801687"/>
+        <a:ext cx="202289" cy="196669"/>
       </dsp:txXfrm>
     </dsp:sp>
     <dsp:sp modelId="{8DB52F31-1B42-4B55-A5C5-93099FA660CA}">
@@ -5692,8 +5638,8 @@
       </dsp:nvSpPr>
       <dsp:spPr>
         <a:xfrm>
-          <a:off x="2586222" y="1367509"/>
-          <a:ext cx="2955555" cy="911153"/>
+          <a:off x="2565565" y="1129469"/>
+          <a:ext cx="2996869" cy="749217"/>
         </a:xfrm>
         <a:prstGeom prst="roundRect">
           <a:avLst>
@@ -5822,8 +5768,8 @@
         </a:p>
       </dsp:txBody>
       <dsp:txXfrm>
-        <a:off x="2612909" y="1394196"/>
-        <a:ext cx="2902181" cy="857779"/>
+        <a:off x="2587509" y="1151413"/>
+        <a:ext cx="2952981" cy="705329"/>
       </dsp:txXfrm>
     </dsp:sp>
     <dsp:sp modelId="{D4AF0274-1388-4F6B-8D53-52A6FED89246}">
@@ -5833,8 +5779,8 @@
       </dsp:nvSpPr>
       <dsp:spPr>
         <a:xfrm rot="5400000">
-          <a:off x="3893158" y="2301442"/>
-          <a:ext cx="341682" cy="410019"/>
+          <a:off x="3923521" y="1897417"/>
+          <a:ext cx="280956" cy="337147"/>
         </a:xfrm>
         <a:prstGeom prst="rightArrow">
           <a:avLst>
@@ -5892,19 +5838,19 @@
         </a:p>
       </dsp:txBody>
       <dsp:txXfrm rot="-5400000">
-        <a:off x="3940994" y="2335611"/>
-        <a:ext cx="246011" cy="239177"/>
+        <a:off x="3962855" y="1925513"/>
+        <a:ext cx="202289" cy="196669"/>
       </dsp:txXfrm>
     </dsp:sp>
-    <dsp:sp modelId="{393E3C96-C34C-451A-92F8-886DD2CD2B93}">
+    <dsp:sp modelId="{C625C72E-DFBD-4936-871E-23CCDB1E26A3}">
       <dsp:nvSpPr>
         <dsp:cNvPr id="0" name=""/>
         <dsp:cNvSpPr/>
       </dsp:nvSpPr>
       <dsp:spPr>
         <a:xfrm>
-          <a:off x="2586222" y="2734240"/>
-          <a:ext cx="2955555" cy="911153"/>
+          <a:off x="2565565" y="2253295"/>
+          <a:ext cx="2996869" cy="749217"/>
         </a:xfrm>
         <a:prstGeom prst="roundRect">
           <a:avLst>
@@ -5966,49 +5912,25 @@
             <a:buNone/>
           </a:pPr>
           <a:r>
-            <a:rPr lang="de-DE" sz="1600" kern="1200" dirty="0"/>
-            <a:t>Individual </a:t>
-          </a:r>
-          <a:r>
-            <a:rPr lang="de-DE" sz="1600" kern="1200" dirty="0" err="1"/>
-            <a:t>parameter</a:t>
-          </a:r>
-          <a:r>
-            <a:rPr lang="de-DE" sz="1600" kern="1200" dirty="0"/>
-            <a:t> </a:t>
-          </a:r>
-          <a:r>
-            <a:rPr lang="de-DE" sz="1600" kern="1200" dirty="0" err="1"/>
-            <a:t>values</a:t>
-          </a:r>
-          <a:r>
-            <a:rPr lang="de-DE" sz="1600" kern="1200" dirty="0"/>
-            <a:t> </a:t>
-          </a:r>
-          <a:r>
-            <a:rPr lang="de-DE" sz="1600" kern="1200" dirty="0" err="1"/>
-            <a:t>from</a:t>
-          </a:r>
-          <a:r>
-            <a:rPr lang="de-DE" sz="1600" kern="1200" dirty="0"/>
-            <a:t> „Individuals.xlsx“</a:t>
+            <a:rPr lang="en-US" sz="1600" kern="1200" dirty="0"/>
+            <a:t>Individual characteristics, if an individual is defined</a:t>
           </a:r>
         </a:p>
       </dsp:txBody>
       <dsp:txXfrm>
-        <a:off x="2612909" y="2760927"/>
-        <a:ext cx="2902181" cy="857779"/>
+        <a:off x="2587509" y="2275239"/>
+        <a:ext cx="2952981" cy="705329"/>
       </dsp:txXfrm>
     </dsp:sp>
-    <dsp:sp modelId="{018C7C0E-1BF5-4952-ACA5-977E53384722}">
+    <dsp:sp modelId="{CF86FC70-012F-40D6-8B9A-48484735C015}">
       <dsp:nvSpPr>
         <dsp:cNvPr id="0" name=""/>
         <dsp:cNvSpPr/>
       </dsp:nvSpPr>
       <dsp:spPr>
         <a:xfrm rot="5400000">
-          <a:off x="3893158" y="3668172"/>
-          <a:ext cx="341682" cy="410019"/>
+          <a:off x="3923521" y="3021243"/>
+          <a:ext cx="280956" cy="337147"/>
         </a:xfrm>
         <a:prstGeom prst="rightArrow">
           <a:avLst>
@@ -6050,7 +5972,7 @@
         </a:bodyPr>
         <a:lstStyle/>
         <a:p>
-          <a:pPr marL="0" lvl="0" indent="0" algn="ctr" defTabSz="1066800">
+          <a:pPr marL="0" lvl="0" indent="0" algn="ctr" defTabSz="622300">
             <a:lnSpc>
               <a:spcPct val="90000"/>
             </a:lnSpc>
@@ -6062,23 +5984,23 @@
             </a:spcAft>
             <a:buNone/>
           </a:pPr>
-          <a:endParaRPr lang="en-US" sz="2400" kern="1200"/>
+          <a:endParaRPr lang="en-DE" sz="1400" kern="1200"/>
         </a:p>
       </dsp:txBody>
       <dsp:txXfrm rot="-5400000">
-        <a:off x="3940994" y="3702341"/>
-        <a:ext cx="246011" cy="239177"/>
+        <a:off x="3962855" y="3049339"/>
+        <a:ext cx="202289" cy="196669"/>
       </dsp:txXfrm>
     </dsp:sp>
-    <dsp:sp modelId="{164DDEB3-DF6D-4D8A-AB77-57CE925C2E9F}">
+    <dsp:sp modelId="{393E3C96-C34C-451A-92F8-886DD2CD2B93}">
       <dsp:nvSpPr>
         <dsp:cNvPr id="0" name=""/>
         <dsp:cNvSpPr/>
       </dsp:nvSpPr>
       <dsp:spPr>
         <a:xfrm>
-          <a:off x="2586222" y="4100970"/>
-          <a:ext cx="2955555" cy="911153"/>
+          <a:off x="2565565" y="3377121"/>
+          <a:ext cx="2996869" cy="749217"/>
         </a:xfrm>
         <a:prstGeom prst="roundRect">
           <a:avLst>
@@ -6141,85 +6063,24 @@
           </a:pPr>
           <a:r>
             <a:rPr lang="de-DE" sz="1600" kern="1200" dirty="0"/>
-            <a:t>Parameters </a:t>
-          </a:r>
-          <a:r>
-            <a:rPr lang="de-DE" sz="1600" kern="1200" dirty="0" err="1"/>
-            <a:t>passed</a:t>
-          </a:r>
-          <a:r>
-            <a:rPr lang="de-DE" sz="1600" kern="1200" dirty="0"/>
-            <a:t> </a:t>
-          </a:r>
-          <a:r>
-            <a:rPr lang="de-DE" sz="1600" kern="1200" dirty="0" err="1"/>
-            <a:t>to</a:t>
-          </a:r>
-          <a:r>
-            <a:rPr lang="de-DE" sz="1600" kern="1200" dirty="0"/>
-            <a:t> „</a:t>
-          </a:r>
-          <a:r>
-            <a:rPr lang="de-DE" sz="1600" kern="1200" dirty="0" err="1"/>
-            <a:t>runScenarios</a:t>
-          </a:r>
-          <a:r>
-            <a:rPr lang="de-DE" sz="1600" kern="1200" dirty="0"/>
-            <a:t>()“ </a:t>
-          </a:r>
-          <a:r>
-            <a:rPr lang="de-DE" sz="1600" kern="1200" dirty="0" err="1"/>
-            <a:t>function</a:t>
-          </a:r>
-          <a:r>
-            <a:rPr lang="de-DE" sz="1600" kern="1200" dirty="0"/>
-            <a:t> </a:t>
-          </a:r>
-          <a:r>
-            <a:rPr lang="de-DE" sz="1600" kern="1200" dirty="0" err="1"/>
-            <a:t>with</a:t>
-          </a:r>
-          <a:r>
-            <a:rPr lang="de-DE" sz="1600" kern="1200" dirty="0"/>
-            <a:t> </a:t>
-          </a:r>
-          <a:r>
-            <a:rPr lang="de-DE" sz="1600" kern="1200" dirty="0" err="1"/>
-            <a:t>the</a:t>
-          </a:r>
-          <a:r>
-            <a:rPr lang="de-DE" sz="1600" kern="1200" dirty="0"/>
-            <a:t> „</a:t>
-          </a:r>
-          <a:r>
-            <a:rPr lang="de-DE" sz="1600" kern="1200" dirty="0" err="1"/>
-            <a:t>customParams</a:t>
-          </a:r>
-          <a:r>
-            <a:rPr lang="de-DE" sz="1600" kern="1200" dirty="0"/>
-            <a:t>“ </a:t>
-          </a:r>
-          <a:r>
-            <a:rPr lang="de-DE" sz="1600" kern="1200" dirty="0" err="1"/>
-            <a:t>argument</a:t>
-          </a:r>
-          <a:endParaRPr lang="de-DE" sz="1600" kern="1200" dirty="0"/>
+            <a:t>Individual parameter values from „Individuals.xlsx“, if an individual is defined</a:t>
+          </a:r>
         </a:p>
       </dsp:txBody>
       <dsp:txXfrm>
-        <a:off x="2612909" y="4127657"/>
-        <a:ext cx="2902181" cy="857779"/>
+        <a:off x="2587509" y="3399065"/>
+        <a:ext cx="2952981" cy="705329"/>
       </dsp:txXfrm>
     </dsp:sp>
-    <dsp:sp modelId="{9BA57664-CD12-4F05-BF31-8399FF3938EE}">
+    <dsp:sp modelId="{018C7C0E-1BF5-4952-ACA5-977E53384722}">
       <dsp:nvSpPr>
         <dsp:cNvPr id="0" name=""/>
         <dsp:cNvSpPr/>
       </dsp:nvSpPr>
       <dsp:spPr>
         <a:xfrm rot="5400000">
-          <a:off x="3893158" y="5034903"/>
-          <a:ext cx="341682" cy="410019"/>
+          <a:off x="3923521" y="4145069"/>
+          <a:ext cx="280956" cy="337147"/>
         </a:xfrm>
         <a:prstGeom prst="rightArrow">
           <a:avLst>
@@ -6261,7 +6122,7 @@
         </a:bodyPr>
         <a:lstStyle/>
         <a:p>
-          <a:pPr marL="0" lvl="0" indent="0" algn="ctr" defTabSz="755650">
+          <a:pPr marL="0" lvl="0" indent="0" algn="ctr" defTabSz="1066800">
             <a:lnSpc>
               <a:spcPct val="90000"/>
             </a:lnSpc>
@@ -6273,23 +6134,23 @@
             </a:spcAft>
             <a:buNone/>
           </a:pPr>
-          <a:endParaRPr lang="en-US" sz="1700" kern="1200"/>
+          <a:endParaRPr lang="en-US" sz="2400" kern="1200"/>
         </a:p>
       </dsp:txBody>
       <dsp:txXfrm rot="-5400000">
-        <a:off x="3940994" y="5069072"/>
-        <a:ext cx="246011" cy="239177"/>
+        <a:off x="3962855" y="4173165"/>
+        <a:ext cx="202289" cy="196669"/>
       </dsp:txXfrm>
     </dsp:sp>
-    <dsp:sp modelId="{6F905638-7C0C-4414-A139-2B2E5BFB3BD8}">
+    <dsp:sp modelId="{585E7A7C-0464-4CE6-954B-DB59E1BB4AE8}">
       <dsp:nvSpPr>
         <dsp:cNvPr id="0" name=""/>
         <dsp:cNvSpPr/>
       </dsp:nvSpPr>
       <dsp:spPr>
         <a:xfrm>
-          <a:off x="2586222" y="5467701"/>
-          <a:ext cx="2955555" cy="911153"/>
+          <a:off x="2565565" y="4500947"/>
+          <a:ext cx="2996869" cy="749217"/>
         </a:xfrm>
         <a:prstGeom prst="roundRect">
           <a:avLst>
@@ -6333,12 +6194,12 @@
         </a:fontRef>
       </dsp:style>
       <dsp:txBody>
-        <a:bodyPr spcFirstLastPara="0" vert="horz" wrap="square" lIns="80010" tIns="80010" rIns="80010" bIns="80010" numCol="1" spcCol="1270" anchor="ctr" anchorCtr="0">
+        <a:bodyPr spcFirstLastPara="0" vert="horz" wrap="square" lIns="60960" tIns="60960" rIns="60960" bIns="60960" numCol="1" spcCol="1270" anchor="ctr" anchorCtr="0">
           <a:noAutofit/>
         </a:bodyPr>
         <a:lstStyle/>
         <a:p>
-          <a:pPr marL="0" lvl="0" indent="0" algn="ctr" defTabSz="933450">
+          <a:pPr marL="0" lvl="0" indent="0" algn="ctr" defTabSz="711200">
             <a:lnSpc>
               <a:spcPct val="90000"/>
             </a:lnSpc>
@@ -6351,43 +6212,165 @@
             <a:buNone/>
           </a:pPr>
           <a:r>
-            <a:rPr lang="de-DE" sz="2100" kern="1200" dirty="0"/>
-            <a:t>Parameters </a:t>
-          </a:r>
-          <a:r>
-            <a:rPr lang="de-DE" sz="2100" kern="1200" dirty="0" err="1"/>
-            <a:t>defined</a:t>
-          </a:r>
-          <a:r>
-            <a:rPr lang="de-DE" sz="2100" kern="1200" dirty="0"/>
-            <a:t> in </a:t>
-          </a:r>
-          <a:r>
-            <a:rPr lang="de-DE" sz="2100" kern="1200" dirty="0" err="1"/>
-            <a:t>the</a:t>
-          </a:r>
-          <a:r>
-            <a:rPr lang="de-DE" sz="2100" kern="1200" dirty="0"/>
-            <a:t> </a:t>
-          </a:r>
-          <a:r>
-            <a:rPr lang="de-DE" sz="2100" kern="1200" dirty="0" err="1"/>
-            <a:t>Application</a:t>
-          </a:r>
-          <a:r>
-            <a:rPr lang="de-DE" sz="2100" kern="1200" dirty="0"/>
-            <a:t> </a:t>
-          </a:r>
-          <a:r>
-            <a:rPr lang="de-DE" sz="2100" kern="1200" dirty="0" err="1"/>
-            <a:t>protocol</a:t>
-          </a:r>
-          <a:endParaRPr lang="de-DE" sz="2100" kern="1200" dirty="0"/>
+            <a:rPr lang="de-DE" sz="1600" kern="1200"/>
+            <a:t>Parameters defined in the Application protocol</a:t>
+          </a:r>
+          <a:endParaRPr lang="de-DE" sz="1600" kern="1200" dirty="0"/>
         </a:p>
       </dsp:txBody>
       <dsp:txXfrm>
-        <a:off x="2612909" y="5494388"/>
-        <a:ext cx="2902181" cy="857779"/>
+        <a:off x="2587509" y="4522891"/>
+        <a:ext cx="2952981" cy="705329"/>
+      </dsp:txXfrm>
+    </dsp:sp>
+    <dsp:sp modelId="{C73E5510-A645-4B66-BE03-8D62734B4D94}">
+      <dsp:nvSpPr>
+        <dsp:cNvPr id="0" name=""/>
+        <dsp:cNvSpPr/>
+      </dsp:nvSpPr>
+      <dsp:spPr>
+        <a:xfrm rot="5400000">
+          <a:off x="3923521" y="5268894"/>
+          <a:ext cx="280956" cy="337147"/>
+        </a:xfrm>
+        <a:prstGeom prst="rightArrow">
+          <a:avLst>
+            <a:gd name="adj1" fmla="val 60000"/>
+            <a:gd name="adj2" fmla="val 50000"/>
+          </a:avLst>
+        </a:prstGeom>
+        <a:solidFill>
+          <a:schemeClr val="accent1">
+            <a:tint val="60000"/>
+            <a:hueOff val="0"/>
+            <a:satOff val="0"/>
+            <a:lumOff val="0"/>
+            <a:alphaOff val="0"/>
+          </a:schemeClr>
+        </a:solidFill>
+        <a:ln>
+          <a:noFill/>
+        </a:ln>
+        <a:effectLst/>
+      </dsp:spPr>
+      <dsp:style>
+        <a:lnRef idx="0">
+          <a:scrgbClr r="0" g="0" b="0"/>
+        </a:lnRef>
+        <a:fillRef idx="1">
+          <a:scrgbClr r="0" g="0" b="0"/>
+        </a:fillRef>
+        <a:effectRef idx="0">
+          <a:scrgbClr r="0" g="0" b="0"/>
+        </a:effectRef>
+        <a:fontRef idx="minor">
+          <a:schemeClr val="lt1"/>
+        </a:fontRef>
+      </dsp:style>
+      <dsp:txBody>
+        <a:bodyPr spcFirstLastPara="0" vert="horz" wrap="square" lIns="0" tIns="0" rIns="0" bIns="0" numCol="1" spcCol="1270" anchor="ctr" anchorCtr="0">
+          <a:noAutofit/>
+        </a:bodyPr>
+        <a:lstStyle/>
+        <a:p>
+          <a:pPr marL="0" lvl="0" indent="0" algn="ctr" defTabSz="622300">
+            <a:lnSpc>
+              <a:spcPct val="90000"/>
+            </a:lnSpc>
+            <a:spcBef>
+              <a:spcPct val="0"/>
+            </a:spcBef>
+            <a:spcAft>
+              <a:spcPct val="35000"/>
+            </a:spcAft>
+            <a:buNone/>
+          </a:pPr>
+          <a:endParaRPr lang="en-DE" sz="1400" kern="1200"/>
+        </a:p>
+      </dsp:txBody>
+      <dsp:txXfrm rot="-5400000">
+        <a:off x="3962855" y="5296990"/>
+        <a:ext cx="202289" cy="196669"/>
+      </dsp:txXfrm>
+    </dsp:sp>
+    <dsp:sp modelId="{F76A027D-16C8-4857-90A5-3A8DF22F9B46}">
+      <dsp:nvSpPr>
+        <dsp:cNvPr id="0" name=""/>
+        <dsp:cNvSpPr/>
+      </dsp:nvSpPr>
+      <dsp:spPr>
+        <a:xfrm>
+          <a:off x="2565565" y="5624773"/>
+          <a:ext cx="2996869" cy="749217"/>
+        </a:xfrm>
+        <a:prstGeom prst="roundRect">
+          <a:avLst>
+            <a:gd name="adj" fmla="val 10000"/>
+          </a:avLst>
+        </a:prstGeom>
+        <a:solidFill>
+          <a:schemeClr val="accent1">
+            <a:hueOff val="0"/>
+            <a:satOff val="0"/>
+            <a:lumOff val="0"/>
+            <a:alphaOff val="0"/>
+          </a:schemeClr>
+        </a:solidFill>
+        <a:ln w="12700" cap="flat" cmpd="sng" algn="ctr">
+          <a:solidFill>
+            <a:schemeClr val="lt1">
+              <a:hueOff val="0"/>
+              <a:satOff val="0"/>
+              <a:lumOff val="0"/>
+              <a:alphaOff val="0"/>
+            </a:schemeClr>
+          </a:solidFill>
+          <a:prstDash val="solid"/>
+          <a:miter lim="800000"/>
+        </a:ln>
+        <a:effectLst/>
+      </dsp:spPr>
+      <dsp:style>
+        <a:lnRef idx="2">
+          <a:scrgbClr r="0" g="0" b="0"/>
+        </a:lnRef>
+        <a:fillRef idx="1">
+          <a:scrgbClr r="0" g="0" b="0"/>
+        </a:fillRef>
+        <a:effectRef idx="0">
+          <a:scrgbClr r="0" g="0" b="0"/>
+        </a:effectRef>
+        <a:fontRef idx="minor">
+          <a:schemeClr val="lt1"/>
+        </a:fontRef>
+      </dsp:style>
+      <dsp:txBody>
+        <a:bodyPr spcFirstLastPara="0" vert="horz" wrap="square" lIns="60960" tIns="60960" rIns="60960" bIns="60960" numCol="1" spcCol="1270" anchor="ctr" anchorCtr="0">
+          <a:noAutofit/>
+        </a:bodyPr>
+        <a:lstStyle/>
+        <a:p>
+          <a:pPr marL="0" lvl="0" indent="0" algn="ctr" defTabSz="711200">
+            <a:lnSpc>
+              <a:spcPct val="90000"/>
+            </a:lnSpc>
+            <a:spcBef>
+              <a:spcPct val="0"/>
+            </a:spcBef>
+            <a:spcAft>
+              <a:spcPct val="35000"/>
+            </a:spcAft>
+            <a:buNone/>
+          </a:pPr>
+          <a:r>
+            <a:rPr lang="de-DE" sz="1600" kern="1200" dirty="0"/>
+            <a:t>Parameters passed to the „createScenarios()“ function with the „customParams“ argument</a:t>
+          </a:r>
+        </a:p>
+      </dsp:txBody>
+      <dsp:txXfrm>
+        <a:off x="2587509" y="5646717"/>
+        <a:ext cx="2952981" cy="705329"/>
       </dsp:txXfrm>
     </dsp:sp>
   </dsp:spTree>
@@ -8991,7 +8974,7 @@
           <a:p>
             <a:fld id="{B199164D-C87C-46DA-8BA8-D57C4A9AE1EA}" type="datetimeFigureOut">
               <a:rPr lang="en-US" smtClean="0"/>
-              <a:t>4/26/2023</a:t>
+              <a:t>4/22/2025</a:t>
             </a:fld>
             <a:endParaRPr lang="en-US"/>
           </a:p>
@@ -9189,7 +9172,7 @@
           <a:p>
             <a:fld id="{B199164D-C87C-46DA-8BA8-D57C4A9AE1EA}" type="datetimeFigureOut">
               <a:rPr lang="en-US" smtClean="0"/>
-              <a:t>4/26/2023</a:t>
+              <a:t>4/22/2025</a:t>
             </a:fld>
             <a:endParaRPr lang="en-US"/>
           </a:p>
@@ -9397,7 +9380,7 @@
           <a:p>
             <a:fld id="{B199164D-C87C-46DA-8BA8-D57C4A9AE1EA}" type="datetimeFigureOut">
               <a:rPr lang="en-US" smtClean="0"/>
-              <a:t>4/26/2023</a:t>
+              <a:t>4/22/2025</a:t>
             </a:fld>
             <a:endParaRPr lang="en-US"/>
           </a:p>
@@ -9595,7 +9578,7 @@
           <a:p>
             <a:fld id="{B199164D-C87C-46DA-8BA8-D57C4A9AE1EA}" type="datetimeFigureOut">
               <a:rPr lang="en-US" smtClean="0"/>
-              <a:t>4/26/2023</a:t>
+              <a:t>4/22/2025</a:t>
             </a:fld>
             <a:endParaRPr lang="en-US"/>
           </a:p>
@@ -9870,7 +9853,7 @@
           <a:p>
             <a:fld id="{B199164D-C87C-46DA-8BA8-D57C4A9AE1EA}" type="datetimeFigureOut">
               <a:rPr lang="en-US" smtClean="0"/>
-              <a:t>4/26/2023</a:t>
+              <a:t>4/22/2025</a:t>
             </a:fld>
             <a:endParaRPr lang="en-US"/>
           </a:p>
@@ -10135,7 +10118,7 @@
           <a:p>
             <a:fld id="{B199164D-C87C-46DA-8BA8-D57C4A9AE1EA}" type="datetimeFigureOut">
               <a:rPr lang="en-US" smtClean="0"/>
-              <a:t>4/26/2023</a:t>
+              <a:t>4/22/2025</a:t>
             </a:fld>
             <a:endParaRPr lang="en-US"/>
           </a:p>
@@ -10547,7 +10530,7 @@
           <a:p>
             <a:fld id="{B199164D-C87C-46DA-8BA8-D57C4A9AE1EA}" type="datetimeFigureOut">
               <a:rPr lang="en-US" smtClean="0"/>
-              <a:t>4/26/2023</a:t>
+              <a:t>4/22/2025</a:t>
             </a:fld>
             <a:endParaRPr lang="en-US"/>
           </a:p>
@@ -10688,7 +10671,7 @@
           <a:p>
             <a:fld id="{B199164D-C87C-46DA-8BA8-D57C4A9AE1EA}" type="datetimeFigureOut">
               <a:rPr lang="en-US" smtClean="0"/>
-              <a:t>4/26/2023</a:t>
+              <a:t>4/22/2025</a:t>
             </a:fld>
             <a:endParaRPr lang="en-US"/>
           </a:p>
@@ -10801,7 +10784,7 @@
           <a:p>
             <a:fld id="{B199164D-C87C-46DA-8BA8-D57C4A9AE1EA}" type="datetimeFigureOut">
               <a:rPr lang="en-US" smtClean="0"/>
-              <a:t>4/26/2023</a:t>
+              <a:t>4/22/2025</a:t>
             </a:fld>
             <a:endParaRPr lang="en-US"/>
           </a:p>
@@ -11112,7 +11095,7 @@
           <a:p>
             <a:fld id="{B199164D-C87C-46DA-8BA8-D57C4A9AE1EA}" type="datetimeFigureOut">
               <a:rPr lang="en-US" smtClean="0"/>
-              <a:t>4/26/2023</a:t>
+              <a:t>4/22/2025</a:t>
             </a:fld>
             <a:endParaRPr lang="en-US"/>
           </a:p>
@@ -11400,7 +11383,7 @@
           <a:p>
             <a:fld id="{B199164D-C87C-46DA-8BA8-D57C4A9AE1EA}" type="datetimeFigureOut">
               <a:rPr lang="en-US" smtClean="0"/>
-              <a:t>4/26/2023</a:t>
+              <a:t>4/22/2025</a:t>
             </a:fld>
             <a:endParaRPr lang="en-US"/>
           </a:p>
@@ -11641,7 +11624,7 @@
           <a:p>
             <a:fld id="{B199164D-C87C-46DA-8BA8-D57C4A9AE1EA}" type="datetimeFigureOut">
               <a:rPr lang="en-US" smtClean="0"/>
-              <a:t>4/26/2023</a:t>
+              <a:t>4/22/2025</a:t>
             </a:fld>
             <a:endParaRPr lang="en-US"/>
           </a:p>
@@ -12603,7 +12586,7 @@
           <p:nvPr>
             <p:extLst>
               <p:ext uri="{D42A27DB-BD31-4B8C-83A1-F6EECF244321}">
-                <p14:modId xmlns:p14="http://schemas.microsoft.com/office/powerpoint/2010/main" val="4042890966"/>
+                <p14:modId xmlns:p14="http://schemas.microsoft.com/office/powerpoint/2010/main" val="1417592118"/>
               </p:ext>
             </p:extLst>
           </p:nvPr>

</xml_diff>